<commit_message>
update thesis overleaf chapter results
</commit_message>
<xml_diff>
--- a/thesis/graphs/wpm.pptx
+++ b/thesis/graphs/wpm.pptx
@@ -6,6 +6,7 @@
   </p:sldMasterIdLst>
   <p:sldIdLst>
     <p:sldId id="256" r:id="rId2"/>
+    <p:sldId id="257" r:id="rId3"/>
   </p:sldIdLst>
   <p:sldSz cx="9144000" cy="6858000" type="screen4x3"/>
   <p:notesSz cx="6858000" cy="9144000"/>
@@ -104,6 +105,11 @@
       </a:defRPr>
     </a:lvl9pPr>
   </p:defaultTextStyle>
+  <p:extLst>
+    <p:ext uri="{EFAFB233-063F-42B5-8137-9DF3F51BA10A}">
+      <p15:sldGuideLst xmlns:p15="http://schemas.microsoft.com/office/powerpoint/2012/main"/>
+    </p:ext>
+  </p:extLst>
 </p:presentation>
 </file>
 
@@ -123,7 +129,17 @@
   <c:chart>
     <c:autoTitleDeleted val="1"/>
     <c:plotArea>
-      <c:layout/>
+      <c:layout>
+        <c:manualLayout>
+          <c:layoutTarget val="inner"/>
+          <c:xMode val="edge"/>
+          <c:yMode val="edge"/>
+          <c:x val="8.9756999125109357E-2"/>
+          <c:y val="2.9916593759113441E-2"/>
+          <c:w val="0.88162499999999999"/>
+          <c:h val="0.85257072032662584"/>
+        </c:manualLayout>
+      </c:layout>
       <c:scatterChart>
         <c:scatterStyle val="lineMarker"/>
         <c:varyColors val="0"/>
@@ -142,7 +158,7 @@
             </c:strRef>
           </c:tx>
           <c:spPr>
-            <a:ln w="9525" cap="rnd">
+            <a:ln w="12700" cap="rnd">
               <a:solidFill>
                 <a:schemeClr val="tx1"/>
               </a:solidFill>
@@ -732,7 +748,7 @@
             <c:size val="5"/>
             <c:spPr>
               <a:noFill/>
-              <a:ln w="3175">
+              <a:ln w="12700">
                 <a:solidFill>
                   <a:schemeClr val="tx1"/>
                 </a:solidFill>
@@ -1411,6 +1427,16 @@
     </c:plotArea>
     <c:legend>
       <c:legendPos val="b"/>
+      <c:layout>
+        <c:manualLayout>
+          <c:xMode val="edge"/>
+          <c:yMode val="edge"/>
+          <c:x val="0.67738035870516189"/>
+          <c:y val="0.79976509186351696"/>
+          <c:w val="0.26468372703412074"/>
+          <c:h val="4.4679352580927381E-2"/>
+        </c:manualLayout>
+      </c:layout>
       <c:overlay val="0"/>
       <c:spPr>
         <a:noFill/>
@@ -1427,6 +1453,459 @@
             <a:defRPr sz="1500" b="0" i="0" u="none" strike="noStrike" kern="1200" baseline="0">
               <a:solidFill>
                 <a:schemeClr val="tx1"/>
+              </a:solidFill>
+              <a:latin typeface="+mn-lt"/>
+              <a:ea typeface="+mn-ea"/>
+              <a:cs typeface="+mn-cs"/>
+            </a:defRPr>
+          </a:pPr>
+          <a:endParaRPr lang="en-US"/>
+        </a:p>
+      </c:txPr>
+    </c:legend>
+    <c:plotVisOnly val="1"/>
+    <c:dispBlanksAs val="gap"/>
+    <c:extLst>
+      <c:ext xmlns:c16r3="http://schemas.microsoft.com/office/drawing/2017/03/chart" uri="{56B9EC1D-385E-4148-901F-78D8002777C0}">
+        <c16r3:dataDisplayOptions16>
+          <c16r3:dispNaAsBlank val="1"/>
+        </c16r3:dataDisplayOptions16>
+      </c:ext>
+    </c:extLst>
+    <c:showDLblsOverMax val="0"/>
+  </c:chart>
+  <c:spPr>
+    <a:solidFill>
+      <a:schemeClr val="bg1"/>
+    </a:solidFill>
+    <a:ln w="9525" cap="flat" cmpd="sng" algn="ctr">
+      <a:noFill/>
+      <a:prstDash val="sysDot"/>
+      <a:round/>
+    </a:ln>
+    <a:effectLst/>
+  </c:spPr>
+  <c:txPr>
+    <a:bodyPr/>
+    <a:lstStyle/>
+    <a:p>
+      <a:pPr>
+        <a:defRPr/>
+      </a:pPr>
+      <a:endParaRPr lang="en-US"/>
+    </a:p>
+  </c:txPr>
+  <c:externalData r:id="rId3">
+    <c:autoUpdate val="0"/>
+  </c:externalData>
+</c:chartSpace>
+</file>
+
+<file path=ppt/charts/chart2.xml><?xml version="1.0" encoding="utf-8"?>
+<c:chartSpace xmlns:c="http://schemas.openxmlformats.org/drawingml/2006/chart" xmlns:a="http://schemas.openxmlformats.org/drawingml/2006/main" xmlns:r="http://schemas.openxmlformats.org/officeDocument/2006/relationships" xmlns:c16r2="http://schemas.microsoft.com/office/drawing/2015/06/chart">
+  <c:date1904 val="0"/>
+  <c:lang val="en-US"/>
+  <c:roundedCorners val="0"/>
+  <mc:AlternateContent xmlns:mc="http://schemas.openxmlformats.org/markup-compatibility/2006">
+    <mc:Choice xmlns:c14="http://schemas.microsoft.com/office/drawing/2007/8/2/chart" Requires="c14">
+      <c14:style val="102"/>
+    </mc:Choice>
+    <mc:Fallback>
+      <c:style val="2"/>
+    </mc:Fallback>
+  </mc:AlternateContent>
+  <c:chart>
+    <c:autoTitleDeleted val="1"/>
+    <c:plotArea>
+      <c:layout>
+        <c:manualLayout>
+          <c:layoutTarget val="inner"/>
+          <c:xMode val="edge"/>
+          <c:yMode val="edge"/>
+          <c:x val="9.1145888013998255E-2"/>
+          <c:y val="2.6212890055409742E-2"/>
+          <c:w val="0.88162499999999999"/>
+          <c:h val="0.85442257217847772"/>
+        </c:manualLayout>
+      </c:layout>
+      <c:scatterChart>
+        <c:scatterStyle val="lineMarker"/>
+        <c:varyColors val="0"/>
+        <c:ser>
+          <c:idx val="1"/>
+          <c:order val="1"/>
+          <c:tx>
+            <c:strRef>
+              <c:f>error!$C$1</c:f>
+              <c:strCache>
+                <c:ptCount val="1"/>
+                <c:pt idx="0">
+                  <c:v>error rates</c:v>
+                </c:pt>
+              </c:strCache>
+            </c:strRef>
+          </c:tx>
+          <c:spPr>
+            <a:ln w="6350" cap="rnd">
+              <a:solidFill>
+                <a:schemeClr val="tx1"/>
+              </a:solidFill>
+              <a:round/>
+            </a:ln>
+            <a:effectLst/>
+          </c:spPr>
+          <c:marker>
+            <c:symbol val="x"/>
+            <c:size val="5"/>
+            <c:spPr>
+              <a:noFill/>
+              <a:ln w="12700">
+                <a:solidFill>
+                  <a:schemeClr val="tx1"/>
+                </a:solidFill>
+              </a:ln>
+              <a:effectLst/>
+            </c:spPr>
+          </c:marker>
+          <c:xVal>
+            <c:numRef>
+              <c:f>error!$A$2:$A$11</c:f>
+              <c:numCache>
+                <c:formatCode>General</c:formatCode>
+                <c:ptCount val="10"/>
+                <c:pt idx="0">
+                  <c:v>4</c:v>
+                </c:pt>
+                <c:pt idx="1">
+                  <c:v>8</c:v>
+                </c:pt>
+                <c:pt idx="2">
+                  <c:v>12</c:v>
+                </c:pt>
+                <c:pt idx="3">
+                  <c:v>16</c:v>
+                </c:pt>
+                <c:pt idx="4">
+                  <c:v>24</c:v>
+                </c:pt>
+                <c:pt idx="5">
+                  <c:v>32</c:v>
+                </c:pt>
+                <c:pt idx="6">
+                  <c:v>44</c:v>
+                </c:pt>
+                <c:pt idx="7">
+                  <c:v>56</c:v>
+                </c:pt>
+                <c:pt idx="8">
+                  <c:v>72</c:v>
+                </c:pt>
+                <c:pt idx="9">
+                  <c:v>88</c:v>
+                </c:pt>
+              </c:numCache>
+            </c:numRef>
+          </c:xVal>
+          <c:yVal>
+            <c:numRef>
+              <c:f>error!$C$2:$C$11</c:f>
+              <c:numCache>
+                <c:formatCode>General</c:formatCode>
+                <c:ptCount val="10"/>
+                <c:pt idx="0">
+                  <c:v>15.98</c:v>
+                </c:pt>
+                <c:pt idx="1">
+                  <c:v>9.25</c:v>
+                </c:pt>
+                <c:pt idx="2">
+                  <c:v>5.43</c:v>
+                </c:pt>
+                <c:pt idx="3">
+                  <c:v>6.7</c:v>
+                </c:pt>
+                <c:pt idx="4">
+                  <c:v>4.82</c:v>
+                </c:pt>
+                <c:pt idx="5">
+                  <c:v>4.37</c:v>
+                </c:pt>
+                <c:pt idx="6">
+                  <c:v>3.8</c:v>
+                </c:pt>
+                <c:pt idx="7">
+                  <c:v>5.2</c:v>
+                </c:pt>
+                <c:pt idx="8">
+                  <c:v>4.93</c:v>
+                </c:pt>
+                <c:pt idx="9">
+                  <c:v>6.57</c:v>
+                </c:pt>
+              </c:numCache>
+            </c:numRef>
+          </c:yVal>
+          <c:smooth val="0"/>
+          <c:extLst>
+            <c:ext xmlns:c16="http://schemas.microsoft.com/office/drawing/2014/chart" uri="{C3380CC4-5D6E-409C-BE32-E72D297353CC}">
+              <c16:uniqueId val="{00000000-5ADF-45C9-B597-1088DE828B83}"/>
+            </c:ext>
+          </c:extLst>
+        </c:ser>
+        <c:dLbls>
+          <c:showLegendKey val="0"/>
+          <c:showVal val="0"/>
+          <c:showCatName val="0"/>
+          <c:showSerName val="0"/>
+          <c:showPercent val="0"/>
+          <c:showBubbleSize val="0"/>
+        </c:dLbls>
+        <c:axId val="651328872"/>
+        <c:axId val="651329200"/>
+        <c:extLst>
+          <c:ext xmlns:c15="http://schemas.microsoft.com/office/drawing/2012/chart" uri="{02D57815-91ED-43cb-92C2-25804820EDAC}">
+            <c15:filteredScatterSeries>
+              <c15:ser>
+                <c:idx val="0"/>
+                <c:order val="0"/>
+                <c:tx>
+                  <c:strRef>
+                    <c:extLst>
+                      <c:ext uri="{02D57815-91ED-43cb-92C2-25804820EDAC}">
+                        <c15:formulaRef>
+                          <c15:sqref>error!$B$1</c15:sqref>
+                        </c15:formulaRef>
+                      </c:ext>
+                    </c:extLst>
+                    <c:strCache>
+                      <c:ptCount val="1"/>
+                    </c:strCache>
+                  </c:strRef>
+                </c:tx>
+                <c:spPr>
+                  <a:ln w="9525" cap="rnd">
+                    <a:solidFill>
+                      <a:schemeClr val="tx1"/>
+                    </a:solidFill>
+                    <a:round/>
+                  </a:ln>
+                  <a:effectLst/>
+                </c:spPr>
+                <c:marker>
+                  <c:symbol val="none"/>
+                </c:marker>
+                <c:xVal>
+                  <c:numRef>
+                    <c:extLst>
+                      <c:ext uri="{02D57815-91ED-43cb-92C2-25804820EDAC}">
+                        <c15:formulaRef>
+                          <c15:sqref>error!$A$2:$A$11</c15:sqref>
+                        </c15:formulaRef>
+                      </c:ext>
+                    </c:extLst>
+                    <c:numCache>
+                      <c:formatCode>General</c:formatCode>
+                      <c:ptCount val="10"/>
+                      <c:pt idx="0">
+                        <c:v>4</c:v>
+                      </c:pt>
+                      <c:pt idx="1">
+                        <c:v>8</c:v>
+                      </c:pt>
+                      <c:pt idx="2">
+                        <c:v>12</c:v>
+                      </c:pt>
+                      <c:pt idx="3">
+                        <c:v>16</c:v>
+                      </c:pt>
+                      <c:pt idx="4">
+                        <c:v>24</c:v>
+                      </c:pt>
+                      <c:pt idx="5">
+                        <c:v>32</c:v>
+                      </c:pt>
+                      <c:pt idx="6">
+                        <c:v>44</c:v>
+                      </c:pt>
+                      <c:pt idx="7">
+                        <c:v>56</c:v>
+                      </c:pt>
+                      <c:pt idx="8">
+                        <c:v>72</c:v>
+                      </c:pt>
+                      <c:pt idx="9">
+                        <c:v>88</c:v>
+                      </c:pt>
+                    </c:numCache>
+                  </c:numRef>
+                </c:xVal>
+                <c:yVal>
+                  <c:numRef>
+                    <c:extLst>
+                      <c:ext uri="{02D57815-91ED-43cb-92C2-25804820EDAC}">
+                        <c15:formulaRef>
+                          <c15:sqref>error!$B$2:$B$11</c15:sqref>
+                        </c15:formulaRef>
+                      </c:ext>
+                    </c:extLst>
+                    <c:numCache>
+                      <c:formatCode>General</c:formatCode>
+                      <c:ptCount val="10"/>
+                    </c:numCache>
+                  </c:numRef>
+                </c:yVal>
+                <c:smooth val="0"/>
+                <c:extLst>
+                  <c:ext xmlns:c16="http://schemas.microsoft.com/office/drawing/2014/chart" uri="{C3380CC4-5D6E-409C-BE32-E72D297353CC}">
+                    <c16:uniqueId val="{00000001-5ADF-45C9-B597-1088DE828B83}"/>
+                  </c:ext>
+                </c:extLst>
+              </c15:ser>
+            </c15:filteredScatterSeries>
+          </c:ext>
+        </c:extLst>
+      </c:scatterChart>
+      <c:valAx>
+        <c:axId val="651328872"/>
+        <c:scaling>
+          <c:orientation val="minMax"/>
+          <c:max val="88"/>
+        </c:scaling>
+        <c:delete val="0"/>
+        <c:axPos val="b"/>
+        <c:numFmt formatCode="General" sourceLinked="1"/>
+        <c:majorTickMark val="in"/>
+        <c:minorTickMark val="none"/>
+        <c:tickLblPos val="nextTo"/>
+        <c:spPr>
+          <a:noFill/>
+          <a:ln w="9525" cap="flat" cmpd="sng" algn="ctr">
+            <a:solidFill>
+              <a:schemeClr val="tx1"/>
+            </a:solidFill>
+            <a:round/>
+          </a:ln>
+          <a:effectLst/>
+        </c:spPr>
+        <c:txPr>
+          <a:bodyPr rot="-60000000" spcFirstLastPara="1" vertOverflow="ellipsis" vert="horz" wrap="square" anchor="ctr" anchorCtr="1"/>
+          <a:lstStyle/>
+          <a:p>
+            <a:pPr>
+              <a:defRPr sz="1500" b="0" i="0" u="none" strike="noStrike" kern="1200" baseline="0">
+                <a:solidFill>
+                  <a:schemeClr val="tx1">
+                    <a:lumMod val="65000"/>
+                    <a:lumOff val="35000"/>
+                  </a:schemeClr>
+                </a:solidFill>
+                <a:latin typeface="+mn-lt"/>
+                <a:ea typeface="+mn-ea"/>
+                <a:cs typeface="+mn-cs"/>
+              </a:defRPr>
+            </a:pPr>
+            <a:endParaRPr lang="en-US"/>
+          </a:p>
+        </c:txPr>
+        <c:crossAx val="651329200"/>
+        <c:crosses val="autoZero"/>
+        <c:crossBetween val="midCat"/>
+        <c:majorUnit val="8"/>
+        <c:minorUnit val="2"/>
+      </c:valAx>
+      <c:valAx>
+        <c:axId val="651329200"/>
+        <c:scaling>
+          <c:orientation val="minMax"/>
+        </c:scaling>
+        <c:delete val="0"/>
+        <c:axPos val="l"/>
+        <c:majorGridlines>
+          <c:spPr>
+            <a:ln w="9525" cap="flat" cmpd="sng" algn="ctr">
+              <a:noFill/>
+              <a:round/>
+            </a:ln>
+            <a:effectLst/>
+          </c:spPr>
+        </c:majorGridlines>
+        <c:numFmt formatCode="General" sourceLinked="1"/>
+        <c:majorTickMark val="in"/>
+        <c:minorTickMark val="none"/>
+        <c:tickLblPos val="nextTo"/>
+        <c:spPr>
+          <a:noFill/>
+          <a:ln>
+            <a:solidFill>
+              <a:schemeClr val="tx1"/>
+            </a:solidFill>
+          </a:ln>
+          <a:effectLst/>
+        </c:spPr>
+        <c:txPr>
+          <a:bodyPr rot="-60000000" spcFirstLastPara="1" vertOverflow="ellipsis" vert="horz" wrap="square" anchor="ctr" anchorCtr="1"/>
+          <a:lstStyle/>
+          <a:p>
+            <a:pPr>
+              <a:defRPr sz="1500" b="0" i="0" u="none" strike="noStrike" kern="1200" baseline="0">
+                <a:solidFill>
+                  <a:schemeClr val="tx1">
+                    <a:lumMod val="65000"/>
+                    <a:lumOff val="35000"/>
+                  </a:schemeClr>
+                </a:solidFill>
+                <a:latin typeface="+mn-lt"/>
+                <a:ea typeface="+mn-ea"/>
+                <a:cs typeface="+mn-cs"/>
+              </a:defRPr>
+            </a:pPr>
+            <a:endParaRPr lang="en-US"/>
+          </a:p>
+        </c:txPr>
+        <c:crossAx val="651328872"/>
+        <c:crosses val="autoZero"/>
+        <c:crossBetween val="midCat"/>
+        <c:majorUnit val="5"/>
+      </c:valAx>
+      <c:spPr>
+        <a:noFill/>
+        <a:ln w="25400">
+          <a:noFill/>
+        </a:ln>
+        <a:effectLst/>
+      </c:spPr>
+    </c:plotArea>
+    <c:legend>
+      <c:legendPos val="b"/>
+      <c:layout>
+        <c:manualLayout>
+          <c:xMode val="edge"/>
+          <c:yMode val="edge"/>
+          <c:x val="0.80392618110236214"/>
+          <c:y val="0.80046602508019826"/>
+          <c:w val="0.19438845144356956"/>
+          <c:h val="4.1058681533421459E-2"/>
+        </c:manualLayout>
+      </c:layout>
+      <c:overlay val="0"/>
+      <c:spPr>
+        <a:noFill/>
+        <a:ln>
+          <a:noFill/>
+        </a:ln>
+        <a:effectLst/>
+      </c:spPr>
+      <c:txPr>
+        <a:bodyPr rot="0" spcFirstLastPara="1" vertOverflow="ellipsis" vert="horz" wrap="square" anchor="ctr" anchorCtr="1"/>
+        <a:lstStyle/>
+        <a:p>
+          <a:pPr>
+            <a:defRPr sz="1500" b="0" i="0" u="none" strike="noStrike" kern="1200" baseline="0">
+              <a:solidFill>
+                <a:schemeClr val="tx1">
+                  <a:lumMod val="65000"/>
+                  <a:lumOff val="35000"/>
+                </a:schemeClr>
               </a:solidFill>
               <a:latin typeface="+mn-lt"/>
               <a:ea typeface="+mn-ea"/>
@@ -1481,6 +1960,46 @@
 </file>
 
 <file path=ppt/charts/colors1.xml><?xml version="1.0" encoding="utf-8"?>
+<cs:colorStyle xmlns:cs="http://schemas.microsoft.com/office/drawing/2012/chartStyle" xmlns:a="http://schemas.openxmlformats.org/drawingml/2006/main" meth="cycle" id="10">
+  <a:schemeClr val="accent1"/>
+  <a:schemeClr val="accent2"/>
+  <a:schemeClr val="accent3"/>
+  <a:schemeClr val="accent4"/>
+  <a:schemeClr val="accent5"/>
+  <a:schemeClr val="accent6"/>
+  <cs:variation/>
+  <cs:variation>
+    <a:lumMod val="60000"/>
+  </cs:variation>
+  <cs:variation>
+    <a:lumMod val="80000"/>
+    <a:lumOff val="20000"/>
+  </cs:variation>
+  <cs:variation>
+    <a:lumMod val="80000"/>
+  </cs:variation>
+  <cs:variation>
+    <a:lumMod val="60000"/>
+    <a:lumOff val="40000"/>
+  </cs:variation>
+  <cs:variation>
+    <a:lumMod val="50000"/>
+  </cs:variation>
+  <cs:variation>
+    <a:lumMod val="70000"/>
+    <a:lumOff val="30000"/>
+  </cs:variation>
+  <cs:variation>
+    <a:lumMod val="70000"/>
+  </cs:variation>
+  <cs:variation>
+    <a:lumMod val="50000"/>
+    <a:lumOff val="50000"/>
+  </cs:variation>
+</cs:colorStyle>
+</file>
+
+<file path=ppt/charts/colors2.xml><?xml version="1.0" encoding="utf-8"?>
 <cs:colorStyle xmlns:cs="http://schemas.microsoft.com/office/drawing/2012/chartStyle" xmlns:a="http://schemas.openxmlformats.org/drawingml/2006/main" meth="cycle" id="10">
   <a:schemeClr val="accent1"/>
   <a:schemeClr val="accent2"/>
@@ -2036,6 +2555,522 @@
 </cs:chartStyle>
 </file>
 
+<file path=ppt/charts/style2.xml><?xml version="1.0" encoding="utf-8"?>
+<cs:chartStyle xmlns:cs="http://schemas.microsoft.com/office/drawing/2012/chartStyle" xmlns:a="http://schemas.openxmlformats.org/drawingml/2006/main" id="227">
+  <cs:axisTitle>
+    <cs:lnRef idx="0"/>
+    <cs:fillRef idx="0"/>
+    <cs:effectRef idx="0"/>
+    <cs:fontRef idx="minor">
+      <a:schemeClr val="tx1">
+        <a:lumMod val="65000"/>
+        <a:lumOff val="35000"/>
+      </a:schemeClr>
+    </cs:fontRef>
+    <cs:defRPr sz="1000" kern="1200"/>
+  </cs:axisTitle>
+  <cs:categoryAxis>
+    <cs:lnRef idx="0"/>
+    <cs:fillRef idx="0"/>
+    <cs:effectRef idx="0"/>
+    <cs:fontRef idx="minor">
+      <a:schemeClr val="tx1">
+        <a:lumMod val="65000"/>
+        <a:lumOff val="35000"/>
+      </a:schemeClr>
+    </cs:fontRef>
+    <cs:spPr>
+      <a:ln w="9525" cap="flat" cmpd="sng" algn="ctr">
+        <a:solidFill>
+          <a:schemeClr val="tx1">
+            <a:lumMod val="15000"/>
+            <a:lumOff val="85000"/>
+          </a:schemeClr>
+        </a:solidFill>
+        <a:round/>
+      </a:ln>
+    </cs:spPr>
+    <cs:defRPr sz="900" kern="1200"/>
+  </cs:categoryAxis>
+  <cs:chartArea mods="allowNoFillOverride allowNoLineOverride">
+    <cs:lnRef idx="0"/>
+    <cs:fillRef idx="0"/>
+    <cs:effectRef idx="0"/>
+    <cs:fontRef idx="minor">
+      <a:schemeClr val="tx1"/>
+    </cs:fontRef>
+    <cs:spPr>
+      <a:solidFill>
+        <a:schemeClr val="bg1"/>
+      </a:solidFill>
+      <a:ln w="9525" cap="flat" cmpd="sng" algn="ctr">
+        <a:solidFill>
+          <a:schemeClr val="tx1">
+            <a:lumMod val="15000"/>
+            <a:lumOff val="85000"/>
+          </a:schemeClr>
+        </a:solidFill>
+        <a:round/>
+      </a:ln>
+    </cs:spPr>
+    <cs:defRPr sz="1000" kern="1200"/>
+  </cs:chartArea>
+  <cs:dataLabel>
+    <cs:lnRef idx="0"/>
+    <cs:fillRef idx="0"/>
+    <cs:effectRef idx="0"/>
+    <cs:fontRef idx="minor">
+      <a:schemeClr val="tx1">
+        <a:lumMod val="75000"/>
+        <a:lumOff val="25000"/>
+      </a:schemeClr>
+    </cs:fontRef>
+    <cs:defRPr sz="900" kern="1200"/>
+  </cs:dataLabel>
+  <cs:dataLabelCallout>
+    <cs:lnRef idx="0"/>
+    <cs:fillRef idx="0"/>
+    <cs:effectRef idx="0"/>
+    <cs:fontRef idx="minor">
+      <a:schemeClr val="dk1">
+        <a:lumMod val="65000"/>
+        <a:lumOff val="35000"/>
+      </a:schemeClr>
+    </cs:fontRef>
+    <cs:spPr>
+      <a:solidFill>
+        <a:schemeClr val="lt1"/>
+      </a:solidFill>
+      <a:ln>
+        <a:solidFill>
+          <a:schemeClr val="dk1">
+            <a:lumMod val="25000"/>
+            <a:lumOff val="75000"/>
+          </a:schemeClr>
+        </a:solidFill>
+      </a:ln>
+    </cs:spPr>
+    <cs:defRPr sz="900" kern="1200"/>
+    <cs:bodyPr rot="0" spcFirstLastPara="1" vertOverflow="clip" horzOverflow="clip" vert="horz" wrap="square" lIns="36576" tIns="18288" rIns="36576" bIns="18288" anchor="ctr" anchorCtr="1">
+      <a:spAutoFit/>
+    </cs:bodyPr>
+  </cs:dataLabelCallout>
+  <cs:dataPoint>
+    <cs:lnRef idx="0"/>
+    <cs:fillRef idx="1">
+      <cs:styleClr val="auto"/>
+    </cs:fillRef>
+    <cs:effectRef idx="0"/>
+    <cs:fontRef idx="minor">
+      <a:schemeClr val="tx1"/>
+    </cs:fontRef>
+    <cs:spPr>
+      <a:solidFill>
+        <a:schemeClr val="phClr"/>
+      </a:solidFill>
+    </cs:spPr>
+  </cs:dataPoint>
+  <cs:dataPoint3D>
+    <cs:lnRef idx="0"/>
+    <cs:fillRef idx="1">
+      <cs:styleClr val="auto"/>
+    </cs:fillRef>
+    <cs:effectRef idx="0"/>
+    <cs:fontRef idx="minor">
+      <a:schemeClr val="tx1"/>
+    </cs:fontRef>
+    <cs:spPr>
+      <a:solidFill>
+        <a:schemeClr val="phClr"/>
+      </a:solidFill>
+    </cs:spPr>
+  </cs:dataPoint3D>
+  <cs:dataPointLine>
+    <cs:lnRef idx="0">
+      <cs:styleClr val="auto"/>
+    </cs:lnRef>
+    <cs:fillRef idx="1"/>
+    <cs:effectRef idx="0"/>
+    <cs:fontRef idx="minor">
+      <a:schemeClr val="tx1"/>
+    </cs:fontRef>
+    <cs:spPr>
+      <a:ln w="28575" cap="rnd">
+        <a:solidFill>
+          <a:schemeClr val="phClr"/>
+        </a:solidFill>
+        <a:round/>
+      </a:ln>
+    </cs:spPr>
+  </cs:dataPointLine>
+  <cs:dataPointMarker>
+    <cs:lnRef idx="0">
+      <cs:styleClr val="auto"/>
+    </cs:lnRef>
+    <cs:fillRef idx="1">
+      <cs:styleClr val="auto"/>
+    </cs:fillRef>
+    <cs:effectRef idx="0"/>
+    <cs:fontRef idx="minor">
+      <a:schemeClr val="tx1"/>
+    </cs:fontRef>
+    <cs:spPr>
+      <a:solidFill>
+        <a:schemeClr val="phClr"/>
+      </a:solidFill>
+      <a:ln w="9525">
+        <a:solidFill>
+          <a:schemeClr val="phClr"/>
+        </a:solidFill>
+      </a:ln>
+    </cs:spPr>
+  </cs:dataPointMarker>
+  <cs:dataPointMarkerLayout symbol="circle" size="5"/>
+  <cs:dataPointWireframe>
+    <cs:lnRef idx="0">
+      <cs:styleClr val="auto"/>
+    </cs:lnRef>
+    <cs:fillRef idx="1"/>
+    <cs:effectRef idx="0"/>
+    <cs:fontRef idx="minor">
+      <a:schemeClr val="tx1"/>
+    </cs:fontRef>
+    <cs:spPr>
+      <a:ln w="9525" cap="rnd">
+        <a:solidFill>
+          <a:schemeClr val="phClr"/>
+        </a:solidFill>
+        <a:round/>
+      </a:ln>
+    </cs:spPr>
+  </cs:dataPointWireframe>
+  <cs:dataTable>
+    <cs:lnRef idx="0"/>
+    <cs:fillRef idx="0"/>
+    <cs:effectRef idx="0"/>
+    <cs:fontRef idx="minor">
+      <a:schemeClr val="tx1">
+        <a:lumMod val="65000"/>
+        <a:lumOff val="35000"/>
+      </a:schemeClr>
+    </cs:fontRef>
+    <cs:spPr>
+      <a:noFill/>
+      <a:ln w="9525" cap="flat" cmpd="sng" algn="ctr">
+        <a:solidFill>
+          <a:schemeClr val="tx1">
+            <a:lumMod val="15000"/>
+            <a:lumOff val="85000"/>
+          </a:schemeClr>
+        </a:solidFill>
+        <a:round/>
+      </a:ln>
+    </cs:spPr>
+    <cs:defRPr sz="900" kern="1200"/>
+  </cs:dataTable>
+  <cs:downBar>
+    <cs:lnRef idx="0"/>
+    <cs:fillRef idx="0"/>
+    <cs:effectRef idx="0"/>
+    <cs:fontRef idx="minor">
+      <a:schemeClr val="dk1"/>
+    </cs:fontRef>
+    <cs:spPr>
+      <a:solidFill>
+        <a:schemeClr val="dk1">
+          <a:lumMod val="65000"/>
+          <a:lumOff val="35000"/>
+        </a:schemeClr>
+      </a:solidFill>
+      <a:ln w="9525">
+        <a:solidFill>
+          <a:schemeClr val="tx1">
+            <a:lumMod val="65000"/>
+            <a:lumOff val="35000"/>
+          </a:schemeClr>
+        </a:solidFill>
+      </a:ln>
+    </cs:spPr>
+  </cs:downBar>
+  <cs:dropLine>
+    <cs:lnRef idx="0"/>
+    <cs:fillRef idx="0"/>
+    <cs:effectRef idx="0"/>
+    <cs:fontRef idx="minor">
+      <a:schemeClr val="tx1"/>
+    </cs:fontRef>
+    <cs:spPr>
+      <a:ln w="9525" cap="flat" cmpd="sng" algn="ctr">
+        <a:solidFill>
+          <a:schemeClr val="tx1">
+            <a:lumMod val="35000"/>
+            <a:lumOff val="65000"/>
+          </a:schemeClr>
+        </a:solidFill>
+        <a:round/>
+      </a:ln>
+    </cs:spPr>
+  </cs:dropLine>
+  <cs:errorBar>
+    <cs:lnRef idx="0"/>
+    <cs:fillRef idx="0"/>
+    <cs:effectRef idx="0"/>
+    <cs:fontRef idx="minor">
+      <a:schemeClr val="tx1"/>
+    </cs:fontRef>
+    <cs:spPr>
+      <a:ln w="9525" cap="flat" cmpd="sng" algn="ctr">
+        <a:solidFill>
+          <a:schemeClr val="tx1">
+            <a:lumMod val="65000"/>
+            <a:lumOff val="35000"/>
+          </a:schemeClr>
+        </a:solidFill>
+        <a:round/>
+      </a:ln>
+    </cs:spPr>
+  </cs:errorBar>
+  <cs:floor>
+    <cs:lnRef idx="0"/>
+    <cs:fillRef idx="0"/>
+    <cs:effectRef idx="0"/>
+    <cs:fontRef idx="minor">
+      <a:schemeClr val="tx1"/>
+    </cs:fontRef>
+    <cs:spPr>
+      <a:noFill/>
+      <a:ln>
+        <a:noFill/>
+      </a:ln>
+    </cs:spPr>
+  </cs:floor>
+  <cs:gridlineMajor>
+    <cs:lnRef idx="0"/>
+    <cs:fillRef idx="0"/>
+    <cs:effectRef idx="0"/>
+    <cs:fontRef idx="minor">
+      <a:schemeClr val="tx1"/>
+    </cs:fontRef>
+    <cs:spPr>
+      <a:ln w="9525" cap="flat" cmpd="sng" algn="ctr">
+        <a:solidFill>
+          <a:schemeClr val="tx1">
+            <a:lumMod val="15000"/>
+            <a:lumOff val="85000"/>
+          </a:schemeClr>
+        </a:solidFill>
+        <a:round/>
+      </a:ln>
+    </cs:spPr>
+  </cs:gridlineMajor>
+  <cs:gridlineMinor>
+    <cs:lnRef idx="0"/>
+    <cs:fillRef idx="0"/>
+    <cs:effectRef idx="0"/>
+    <cs:fontRef idx="minor">
+      <a:schemeClr val="tx1"/>
+    </cs:fontRef>
+    <cs:spPr>
+      <a:ln w="9525" cap="flat" cmpd="sng" algn="ctr">
+        <a:solidFill>
+          <a:schemeClr val="tx1">
+            <a:lumMod val="5000"/>
+            <a:lumOff val="95000"/>
+          </a:schemeClr>
+        </a:solidFill>
+        <a:round/>
+      </a:ln>
+    </cs:spPr>
+  </cs:gridlineMinor>
+  <cs:hiLoLine>
+    <cs:lnRef idx="0"/>
+    <cs:fillRef idx="0"/>
+    <cs:effectRef idx="0"/>
+    <cs:fontRef idx="minor">
+      <a:schemeClr val="tx1"/>
+    </cs:fontRef>
+    <cs:spPr>
+      <a:ln w="9525" cap="flat" cmpd="sng" algn="ctr">
+        <a:solidFill>
+          <a:schemeClr val="tx1">
+            <a:lumMod val="75000"/>
+            <a:lumOff val="25000"/>
+          </a:schemeClr>
+        </a:solidFill>
+        <a:round/>
+      </a:ln>
+    </cs:spPr>
+  </cs:hiLoLine>
+  <cs:leaderLine>
+    <cs:lnRef idx="0"/>
+    <cs:fillRef idx="0"/>
+    <cs:effectRef idx="0"/>
+    <cs:fontRef idx="minor">
+      <a:schemeClr val="tx1"/>
+    </cs:fontRef>
+    <cs:spPr>
+      <a:ln w="9525" cap="flat" cmpd="sng" algn="ctr">
+        <a:solidFill>
+          <a:schemeClr val="tx1">
+            <a:lumMod val="35000"/>
+            <a:lumOff val="65000"/>
+          </a:schemeClr>
+        </a:solidFill>
+        <a:round/>
+      </a:ln>
+    </cs:spPr>
+  </cs:leaderLine>
+  <cs:legend>
+    <cs:lnRef idx="0"/>
+    <cs:fillRef idx="0"/>
+    <cs:effectRef idx="0"/>
+    <cs:fontRef idx="minor">
+      <a:schemeClr val="tx1">
+        <a:lumMod val="65000"/>
+        <a:lumOff val="35000"/>
+      </a:schemeClr>
+    </cs:fontRef>
+    <cs:defRPr sz="900" kern="1200"/>
+  </cs:legend>
+  <cs:plotArea mods="allowNoFillOverride allowNoLineOverride">
+    <cs:lnRef idx="0"/>
+    <cs:fillRef idx="0"/>
+    <cs:effectRef idx="0"/>
+    <cs:fontRef idx="minor">
+      <a:schemeClr val="tx1"/>
+    </cs:fontRef>
+  </cs:plotArea>
+  <cs:plotArea3D mods="allowNoFillOverride allowNoLineOverride">
+    <cs:lnRef idx="0"/>
+    <cs:fillRef idx="0"/>
+    <cs:effectRef idx="0"/>
+    <cs:fontRef idx="minor">
+      <a:schemeClr val="tx1"/>
+    </cs:fontRef>
+  </cs:plotArea3D>
+  <cs:seriesAxis>
+    <cs:lnRef idx="0"/>
+    <cs:fillRef idx="0"/>
+    <cs:effectRef idx="0"/>
+    <cs:fontRef idx="minor">
+      <a:schemeClr val="tx1">
+        <a:lumMod val="65000"/>
+        <a:lumOff val="35000"/>
+      </a:schemeClr>
+    </cs:fontRef>
+    <cs:defRPr sz="900" kern="1200"/>
+  </cs:seriesAxis>
+  <cs:seriesLine>
+    <cs:lnRef idx="0"/>
+    <cs:fillRef idx="0"/>
+    <cs:effectRef idx="0"/>
+    <cs:fontRef idx="minor">
+      <a:schemeClr val="tx1"/>
+    </cs:fontRef>
+    <cs:spPr>
+      <a:ln w="9525" cap="flat" cmpd="sng" algn="ctr">
+        <a:solidFill>
+          <a:schemeClr val="tx1">
+            <a:lumMod val="35000"/>
+            <a:lumOff val="65000"/>
+          </a:schemeClr>
+        </a:solidFill>
+        <a:round/>
+      </a:ln>
+    </cs:spPr>
+  </cs:seriesLine>
+  <cs:title>
+    <cs:lnRef idx="0"/>
+    <cs:fillRef idx="0"/>
+    <cs:effectRef idx="0"/>
+    <cs:fontRef idx="minor">
+      <a:schemeClr val="tx1">
+        <a:lumMod val="65000"/>
+        <a:lumOff val="35000"/>
+      </a:schemeClr>
+    </cs:fontRef>
+    <cs:defRPr sz="1400" b="0" kern="1200" spc="0" baseline="0"/>
+  </cs:title>
+  <cs:trendline>
+    <cs:lnRef idx="0">
+      <cs:styleClr val="auto"/>
+    </cs:lnRef>
+    <cs:fillRef idx="0"/>
+    <cs:effectRef idx="0"/>
+    <cs:fontRef idx="minor">
+      <a:schemeClr val="tx1"/>
+    </cs:fontRef>
+    <cs:spPr>
+      <a:ln w="19050" cap="rnd">
+        <a:solidFill>
+          <a:schemeClr val="phClr"/>
+        </a:solidFill>
+        <a:prstDash val="sysDot"/>
+      </a:ln>
+    </cs:spPr>
+  </cs:trendline>
+  <cs:trendlineLabel>
+    <cs:lnRef idx="0"/>
+    <cs:fillRef idx="0"/>
+    <cs:effectRef idx="0"/>
+    <cs:fontRef idx="minor">
+      <a:schemeClr val="tx1">
+        <a:lumMod val="65000"/>
+        <a:lumOff val="35000"/>
+      </a:schemeClr>
+    </cs:fontRef>
+    <cs:defRPr sz="900" kern="1200"/>
+  </cs:trendlineLabel>
+  <cs:upBar>
+    <cs:lnRef idx="0"/>
+    <cs:fillRef idx="0"/>
+    <cs:effectRef idx="0"/>
+    <cs:fontRef idx="minor">
+      <a:schemeClr val="dk1"/>
+    </cs:fontRef>
+    <cs:spPr>
+      <a:solidFill>
+        <a:schemeClr val="lt1"/>
+      </a:solidFill>
+      <a:ln w="9525">
+        <a:solidFill>
+          <a:schemeClr val="tx1">
+            <a:lumMod val="15000"/>
+            <a:lumOff val="85000"/>
+          </a:schemeClr>
+        </a:solidFill>
+      </a:ln>
+    </cs:spPr>
+  </cs:upBar>
+  <cs:valueAxis>
+    <cs:lnRef idx="0"/>
+    <cs:fillRef idx="0"/>
+    <cs:effectRef idx="0"/>
+    <cs:fontRef idx="minor">
+      <a:schemeClr val="tx1">
+        <a:lumMod val="65000"/>
+        <a:lumOff val="35000"/>
+      </a:schemeClr>
+    </cs:fontRef>
+    <cs:defRPr sz="900" kern="1200"/>
+  </cs:valueAxis>
+  <cs:wall>
+    <cs:lnRef idx="0"/>
+    <cs:fillRef idx="0"/>
+    <cs:effectRef idx="0"/>
+    <cs:fontRef idx="minor">
+      <a:schemeClr val="tx1"/>
+    </cs:fontRef>
+    <cs:spPr>
+      <a:noFill/>
+      <a:ln>
+        <a:noFill/>
+      </a:ln>
+    </cs:spPr>
+  </cs:wall>
+</cs:chartStyle>
+</file>
+
 <file path=ppt/slideLayouts/slideLayout1.xml><?xml version="1.0" encoding="utf-8"?>
 <p:sldLayout xmlns:a="http://schemas.openxmlformats.org/drawingml/2006/main" xmlns:r="http://schemas.openxmlformats.org/officeDocument/2006/relationships" xmlns:p="http://schemas.openxmlformats.org/presentationml/2006/main" type="title" preserve="1">
   <p:cSld name="Title Slide">
@@ -2167,7 +3202,7 @@
           <a:p>
             <a:fld id="{A1ACBD55-BE38-45B6-9B46-30AD92DEC746}" type="datetimeFigureOut">
               <a:rPr lang="en-GB" smtClean="0"/>
-              <a:t>21/02/2021</a:t>
+              <a:t>22/02/2021</a:t>
             </a:fld>
             <a:endParaRPr lang="en-GB"/>
           </a:p>
@@ -2337,7 +3372,7 @@
           <a:p>
             <a:fld id="{A1ACBD55-BE38-45B6-9B46-30AD92DEC746}" type="datetimeFigureOut">
               <a:rPr lang="en-GB" smtClean="0"/>
-              <a:t>21/02/2021</a:t>
+              <a:t>22/02/2021</a:t>
             </a:fld>
             <a:endParaRPr lang="en-GB"/>
           </a:p>
@@ -2517,7 +3552,7 @@
           <a:p>
             <a:fld id="{A1ACBD55-BE38-45B6-9B46-30AD92DEC746}" type="datetimeFigureOut">
               <a:rPr lang="en-GB" smtClean="0"/>
-              <a:t>21/02/2021</a:t>
+              <a:t>22/02/2021</a:t>
             </a:fld>
             <a:endParaRPr lang="en-GB"/>
           </a:p>
@@ -2687,7 +3722,7 @@
           <a:p>
             <a:fld id="{A1ACBD55-BE38-45B6-9B46-30AD92DEC746}" type="datetimeFigureOut">
               <a:rPr lang="en-GB" smtClean="0"/>
-              <a:t>21/02/2021</a:t>
+              <a:t>22/02/2021</a:t>
             </a:fld>
             <a:endParaRPr lang="en-GB"/>
           </a:p>
@@ -2931,7 +3966,7 @@
           <a:p>
             <a:fld id="{A1ACBD55-BE38-45B6-9B46-30AD92DEC746}" type="datetimeFigureOut">
               <a:rPr lang="en-GB" smtClean="0"/>
-              <a:t>21/02/2021</a:t>
+              <a:t>22/02/2021</a:t>
             </a:fld>
             <a:endParaRPr lang="en-GB"/>
           </a:p>
@@ -3163,7 +4198,7 @@
           <a:p>
             <a:fld id="{A1ACBD55-BE38-45B6-9B46-30AD92DEC746}" type="datetimeFigureOut">
               <a:rPr lang="en-GB" smtClean="0"/>
-              <a:t>21/02/2021</a:t>
+              <a:t>22/02/2021</a:t>
             </a:fld>
             <a:endParaRPr lang="en-GB"/>
           </a:p>
@@ -3530,7 +4565,7 @@
           <a:p>
             <a:fld id="{A1ACBD55-BE38-45B6-9B46-30AD92DEC746}" type="datetimeFigureOut">
               <a:rPr lang="en-GB" smtClean="0"/>
-              <a:t>21/02/2021</a:t>
+              <a:t>22/02/2021</a:t>
             </a:fld>
             <a:endParaRPr lang="en-GB"/>
           </a:p>
@@ -3648,7 +4683,7 @@
           <a:p>
             <a:fld id="{A1ACBD55-BE38-45B6-9B46-30AD92DEC746}" type="datetimeFigureOut">
               <a:rPr lang="en-GB" smtClean="0"/>
-              <a:t>21/02/2021</a:t>
+              <a:t>22/02/2021</a:t>
             </a:fld>
             <a:endParaRPr lang="en-GB"/>
           </a:p>
@@ -3743,7 +4778,7 @@
           <a:p>
             <a:fld id="{A1ACBD55-BE38-45B6-9B46-30AD92DEC746}" type="datetimeFigureOut">
               <a:rPr lang="en-GB" smtClean="0"/>
-              <a:t>21/02/2021</a:t>
+              <a:t>22/02/2021</a:t>
             </a:fld>
             <a:endParaRPr lang="en-GB"/>
           </a:p>
@@ -4020,7 +5055,7 @@
           <a:p>
             <a:fld id="{A1ACBD55-BE38-45B6-9B46-30AD92DEC746}" type="datetimeFigureOut">
               <a:rPr lang="en-GB" smtClean="0"/>
-              <a:t>21/02/2021</a:t>
+              <a:t>22/02/2021</a:t>
             </a:fld>
             <a:endParaRPr lang="en-GB"/>
           </a:p>
@@ -4277,7 +5312,7 @@
           <a:p>
             <a:fld id="{A1ACBD55-BE38-45B6-9B46-30AD92DEC746}" type="datetimeFigureOut">
               <a:rPr lang="en-GB" smtClean="0"/>
-              <a:t>21/02/2021</a:t>
+              <a:t>22/02/2021</a:t>
             </a:fld>
             <a:endParaRPr lang="en-GB"/>
           </a:p>
@@ -4490,7 +5525,7 @@
           <a:p>
             <a:fld id="{A1ACBD55-BE38-45B6-9B46-30AD92DEC746}" type="datetimeFigureOut">
               <a:rPr lang="en-GB" smtClean="0"/>
-              <a:t>21/02/2021</a:t>
+              <a:t>22/02/2021</a:t>
             </a:fld>
             <a:endParaRPr lang="en-GB"/>
           </a:p>
@@ -4910,14 +5945,14 @@
           <p:nvPr>
             <p:extLst>
               <p:ext uri="{D42A27DB-BD31-4B8C-83A1-F6EECF244321}">
-                <p14:modId xmlns:p14="http://schemas.microsoft.com/office/powerpoint/2010/main" val="3733061073"/>
+                <p14:modId xmlns:p14="http://schemas.microsoft.com/office/powerpoint/2010/main" val="43381102"/>
               </p:ext>
             </p:extLst>
           </p:nvPr>
         </p:nvGraphicFramePr>
         <p:xfrm>
-          <a:off x="64900" y="235600"/>
-          <a:ext cx="8788155" cy="6471732"/>
+          <a:off x="0" y="0"/>
+          <a:ext cx="9144000" cy="6858000"/>
         </p:xfrm>
         <a:graphic>
           <a:graphicData uri="http://schemas.openxmlformats.org/drawingml/2006/chart">
@@ -4925,10 +5960,313 @@
           </a:graphicData>
         </a:graphic>
       </p:graphicFrame>
+      <p:grpSp>
+        <p:nvGrpSpPr>
+          <p:cNvPr id="6" name="Group 5">
+            <a:extLst>
+              <a:ext uri="{FF2B5EF4-FFF2-40B4-BE49-F238E27FC236}">
+                <a16:creationId xmlns:a16="http://schemas.microsoft.com/office/drawing/2014/main" id="{0497A84E-6D6A-4679-B850-91651CD206AA}"/>
+              </a:ext>
+            </a:extLst>
+          </p:cNvPr>
+          <p:cNvGrpSpPr/>
+          <p:nvPr/>
+        </p:nvGrpSpPr>
+        <p:grpSpPr>
+          <a:xfrm>
+            <a:off x="6577446" y="5465618"/>
+            <a:ext cx="2416812" cy="323165"/>
+            <a:chOff x="6832023" y="5465618"/>
+            <a:chExt cx="2416812" cy="323165"/>
+          </a:xfrm>
+        </p:grpSpPr>
+        <p:sp>
+          <p:nvSpPr>
+            <p:cNvPr id="2" name="TextBox 1">
+              <a:extLst>
+                <a:ext uri="{FF2B5EF4-FFF2-40B4-BE49-F238E27FC236}">
+                  <a16:creationId xmlns:a16="http://schemas.microsoft.com/office/drawing/2014/main" id="{F50126CA-A6C8-47F8-B60D-FED469333204}"/>
+                </a:ext>
+              </a:extLst>
+            </p:cNvPr>
+            <p:cNvSpPr txBox="1"/>
+            <p:nvPr/>
+          </p:nvSpPr>
+          <p:spPr>
+            <a:xfrm>
+              <a:off x="6832023" y="5465618"/>
+              <a:ext cx="996491" cy="323165"/>
+            </a:xfrm>
+            <a:prstGeom prst="rect">
+              <a:avLst/>
+            </a:prstGeom>
+            <a:solidFill>
+              <a:schemeClr val="bg1"/>
+            </a:solidFill>
+          </p:spPr>
+          <p:txBody>
+            <a:bodyPr wrap="none" rtlCol="0">
+              <a:spAutoFit/>
+            </a:bodyPr>
+            <a:lstStyle/>
+            <a:p>
+              <a:r>
+                <a:rPr lang="en-GB" sz="1500" dirty="0"/>
+                <a:t>fitted data</a:t>
+              </a:r>
+            </a:p>
+          </p:txBody>
+        </p:sp>
+        <p:sp>
+          <p:nvSpPr>
+            <p:cNvPr id="5" name="TextBox 4">
+              <a:extLst>
+                <a:ext uri="{FF2B5EF4-FFF2-40B4-BE49-F238E27FC236}">
+                  <a16:creationId xmlns:a16="http://schemas.microsoft.com/office/drawing/2014/main" id="{30AE580D-B3BB-4D28-AFD8-1A8F680FEAFE}"/>
+                </a:ext>
+              </a:extLst>
+            </p:cNvPr>
+            <p:cNvSpPr txBox="1"/>
+            <p:nvPr/>
+          </p:nvSpPr>
+          <p:spPr>
+            <a:xfrm>
+              <a:off x="7976755" y="5465618"/>
+              <a:ext cx="1272080" cy="323165"/>
+            </a:xfrm>
+            <a:prstGeom prst="rect">
+              <a:avLst/>
+            </a:prstGeom>
+            <a:solidFill>
+              <a:schemeClr val="bg1"/>
+            </a:solidFill>
+          </p:spPr>
+          <p:txBody>
+            <a:bodyPr wrap="none" rtlCol="0">
+              <a:spAutoFit/>
+            </a:bodyPr>
+            <a:lstStyle/>
+            <a:p>
+              <a:r>
+                <a:rPr lang="en-GB" sz="1500" dirty="0"/>
+                <a:t>WPM average</a:t>
+              </a:r>
+            </a:p>
+          </p:txBody>
+        </p:sp>
+      </p:grpSp>
+      <p:sp>
+        <p:nvSpPr>
+          <p:cNvPr id="7" name="TextBox 6">
+            <a:extLst>
+              <a:ext uri="{FF2B5EF4-FFF2-40B4-BE49-F238E27FC236}">
+                <a16:creationId xmlns:a16="http://schemas.microsoft.com/office/drawing/2014/main" id="{4B1B211C-E3C1-41A2-80CB-BA99A6499C03}"/>
+              </a:ext>
+            </a:extLst>
+          </p:cNvPr>
+          <p:cNvSpPr txBox="1"/>
+          <p:nvPr/>
+        </p:nvSpPr>
+        <p:spPr>
+          <a:xfrm>
+            <a:off x="4010892" y="6478732"/>
+            <a:ext cx="1445460" cy="323165"/>
+          </a:xfrm>
+          <a:prstGeom prst="rect">
+            <a:avLst/>
+          </a:prstGeom>
+          <a:solidFill>
+            <a:schemeClr val="bg1"/>
+          </a:solidFill>
+        </p:spPr>
+        <p:txBody>
+          <a:bodyPr wrap="none" rtlCol="0">
+            <a:spAutoFit/>
+          </a:bodyPr>
+          <a:lstStyle/>
+          <a:p>
+            <a:r>
+              <a:rPr lang="en-GB" sz="1500" dirty="0"/>
+              <a:t>Phrases entered</a:t>
+            </a:r>
+          </a:p>
+        </p:txBody>
+      </p:sp>
+      <p:sp>
+        <p:nvSpPr>
+          <p:cNvPr id="8" name="TextBox 7">
+            <a:extLst>
+              <a:ext uri="{FF2B5EF4-FFF2-40B4-BE49-F238E27FC236}">
+                <a16:creationId xmlns:a16="http://schemas.microsoft.com/office/drawing/2014/main" id="{A9F9AE37-810F-4A10-8A31-5A3A2AF79520}"/>
+              </a:ext>
+            </a:extLst>
+          </p:cNvPr>
+          <p:cNvSpPr txBox="1"/>
+          <p:nvPr/>
+        </p:nvSpPr>
+        <p:spPr>
+          <a:xfrm rot="16200000">
+            <a:off x="-127977" y="2957076"/>
+            <a:ext cx="620683" cy="323165"/>
+          </a:xfrm>
+          <a:prstGeom prst="rect">
+            <a:avLst/>
+          </a:prstGeom>
+          <a:solidFill>
+            <a:schemeClr val="bg1"/>
+          </a:solidFill>
+        </p:spPr>
+        <p:txBody>
+          <a:bodyPr wrap="none" rtlCol="0">
+            <a:spAutoFit/>
+          </a:bodyPr>
+          <a:lstStyle/>
+          <a:p>
+            <a:r>
+              <a:rPr lang="en-GB" sz="1500" dirty="0"/>
+              <a:t>WPM</a:t>
+            </a:r>
+          </a:p>
+        </p:txBody>
+      </p:sp>
     </p:spTree>
     <p:extLst>
       <p:ext uri="{BB962C8B-B14F-4D97-AF65-F5344CB8AC3E}">
         <p14:creationId xmlns:p14="http://schemas.microsoft.com/office/powerpoint/2010/main" val="2244915046"/>
+      </p:ext>
+    </p:extLst>
+  </p:cSld>
+  <p:clrMapOvr>
+    <a:masterClrMapping/>
+  </p:clrMapOvr>
+</p:sld>
+</file>
+
+<file path=ppt/slides/slide2.xml><?xml version="1.0" encoding="utf-8"?>
+<p:sld xmlns:a="http://schemas.openxmlformats.org/drawingml/2006/main" xmlns:r="http://schemas.openxmlformats.org/officeDocument/2006/relationships" xmlns:p="http://schemas.openxmlformats.org/presentationml/2006/main">
+  <p:cSld>
+    <p:spTree>
+      <p:nvGrpSpPr>
+        <p:cNvPr id="1" name=""/>
+        <p:cNvGrpSpPr/>
+        <p:nvPr/>
+      </p:nvGrpSpPr>
+      <p:grpSpPr>
+        <a:xfrm>
+          <a:off x="0" y="0"/>
+          <a:ext cx="0" cy="0"/>
+          <a:chOff x="0" y="0"/>
+          <a:chExt cx="0" cy="0"/>
+        </a:xfrm>
+      </p:grpSpPr>
+      <p:graphicFrame>
+        <p:nvGraphicFramePr>
+          <p:cNvPr id="2" name="Chart 1">
+            <a:extLst>
+              <a:ext uri="{FF2B5EF4-FFF2-40B4-BE49-F238E27FC236}">
+                <a16:creationId xmlns:a16="http://schemas.microsoft.com/office/drawing/2014/main" id="{B784C61A-47E2-44D0-AD61-70AC5CCAE6B8}"/>
+              </a:ext>
+            </a:extLst>
+          </p:cNvPr>
+          <p:cNvGraphicFramePr>
+            <a:graphicFrameLocks/>
+          </p:cNvGraphicFramePr>
+          <p:nvPr>
+            <p:extLst>
+              <p:ext uri="{D42A27DB-BD31-4B8C-83A1-F6EECF244321}">
+                <p14:modId xmlns:p14="http://schemas.microsoft.com/office/powerpoint/2010/main" val="1063351438"/>
+              </p:ext>
+            </p:extLst>
+          </p:nvPr>
+        </p:nvGraphicFramePr>
+        <p:xfrm>
+          <a:off x="0" y="0"/>
+          <a:ext cx="9144000" cy="6858000"/>
+        </p:xfrm>
+        <a:graphic>
+          <a:graphicData uri="http://schemas.openxmlformats.org/drawingml/2006/chart">
+            <c:chart xmlns:c="http://schemas.openxmlformats.org/drawingml/2006/chart" xmlns:r="http://schemas.openxmlformats.org/officeDocument/2006/relationships" r:id="rId2"/>
+          </a:graphicData>
+        </a:graphic>
+      </p:graphicFrame>
+      <p:sp>
+        <p:nvSpPr>
+          <p:cNvPr id="3" name="TextBox 2">
+            <a:extLst>
+              <a:ext uri="{FF2B5EF4-FFF2-40B4-BE49-F238E27FC236}">
+                <a16:creationId xmlns:a16="http://schemas.microsoft.com/office/drawing/2014/main" id="{061D265F-B3DD-4FD0-A73F-0E437CBEAB38}"/>
+              </a:ext>
+            </a:extLst>
+          </p:cNvPr>
+          <p:cNvSpPr txBox="1"/>
+          <p:nvPr/>
+        </p:nvSpPr>
+        <p:spPr>
+          <a:xfrm>
+            <a:off x="4010892" y="6478732"/>
+            <a:ext cx="1445460" cy="323165"/>
+          </a:xfrm>
+          <a:prstGeom prst="rect">
+            <a:avLst/>
+          </a:prstGeom>
+          <a:solidFill>
+            <a:schemeClr val="bg1"/>
+          </a:solidFill>
+        </p:spPr>
+        <p:txBody>
+          <a:bodyPr wrap="none" rtlCol="0">
+            <a:spAutoFit/>
+          </a:bodyPr>
+          <a:lstStyle/>
+          <a:p>
+            <a:r>
+              <a:rPr lang="en-GB" sz="1500" dirty="0"/>
+              <a:t>Phrases entered</a:t>
+            </a:r>
+          </a:p>
+        </p:txBody>
+      </p:sp>
+      <p:sp>
+        <p:nvSpPr>
+          <p:cNvPr id="4" name="TextBox 3">
+            <a:extLst>
+              <a:ext uri="{FF2B5EF4-FFF2-40B4-BE49-F238E27FC236}">
+                <a16:creationId xmlns:a16="http://schemas.microsoft.com/office/drawing/2014/main" id="{CA2092E9-BC75-42C9-9F87-3DE91F76616B}"/>
+              </a:ext>
+            </a:extLst>
+          </p:cNvPr>
+          <p:cNvSpPr txBox="1"/>
+          <p:nvPr/>
+        </p:nvSpPr>
+        <p:spPr>
+          <a:xfrm rot="16200000">
+            <a:off x="-304851" y="2957076"/>
+            <a:ext cx="974434" cy="323165"/>
+          </a:xfrm>
+          <a:prstGeom prst="rect">
+            <a:avLst/>
+          </a:prstGeom>
+          <a:solidFill>
+            <a:schemeClr val="bg1"/>
+          </a:solidFill>
+        </p:spPr>
+        <p:txBody>
+          <a:bodyPr wrap="none" rtlCol="0">
+            <a:spAutoFit/>
+          </a:bodyPr>
+          <a:lstStyle/>
+          <a:p>
+            <a:r>
+              <a:rPr lang="en-GB" sz="1500" dirty="0"/>
+              <a:t>Error Rate</a:t>
+            </a:r>
+          </a:p>
+        </p:txBody>
+      </p:sp>
+    </p:spTree>
+    <p:extLst>
+      <p:ext uri="{BB962C8B-B14F-4D97-AF65-F5344CB8AC3E}">
+        <p14:creationId xmlns:p14="http://schemas.microsoft.com/office/powerpoint/2010/main" val="1840459773"/>
       </p:ext>
     </p:extLst>
   </p:cSld>

</xml_diff>

<commit_message>
update chapter current technology
overleaf update, update on references and wpm, changed backspace
</commit_message>
<xml_diff>
--- a/thesis/graphs/wpm.pptx
+++ b/thesis/graphs/wpm.pptx
@@ -134,10 +134,10 @@
           <c:layoutTarget val="inner"/>
           <c:xMode val="edge"/>
           <c:yMode val="edge"/>
-          <c:x val="8.9756999125109357E-2"/>
-          <c:y val="2.9916593759113441E-2"/>
-          <c:w val="0.88162499999999999"/>
-          <c:h val="0.85257072032662584"/>
+          <c:x val="8.2812554680664924E-2"/>
+          <c:y val="2.6212893877645652E-2"/>
+          <c:w val="0.89134722222222207"/>
+          <c:h val="0.83775588185416783"/>
         </c:manualLayout>
       </c:layout>
       <c:scatterChart>
@@ -148,17 +148,17 @@
           <c:order val="0"/>
           <c:tx>
             <c:strRef>
-              <c:f>Sheet2!$B$1</c:f>
+              <c:f>wpm!$B$1</c:f>
               <c:strCache>
                 <c:ptCount val="1"/>
                 <c:pt idx="0">
-                  <c:v>wpm exp</c:v>
+                  <c:v>fitted data</c:v>
                 </c:pt>
               </c:strCache>
             </c:strRef>
           </c:tx>
           <c:spPr>
-            <a:ln w="12700" cap="rnd">
+            <a:ln w="9525" cap="rnd">
               <a:solidFill>
                 <a:schemeClr val="tx1"/>
               </a:solidFill>
@@ -171,7 +171,7 @@
           </c:marker>
           <c:xVal>
             <c:numRef>
-              <c:f>Sheet2!$A$2:$A$89</c:f>
+              <c:f>wpm!$A$2:$A$89</c:f>
               <c:numCache>
                 <c:formatCode>General</c:formatCode>
                 <c:ptCount val="88"/>
@@ -444,273 +444,273 @@
           </c:xVal>
           <c:yVal>
             <c:numRef>
-              <c:f>Sheet2!$B$2:$B$89</c:f>
+              <c:f>wpm!$B$2:$B$89</c:f>
               <c:numCache>
                 <c:formatCode>General</c:formatCode>
                 <c:ptCount val="88"/>
                 <c:pt idx="0">
-                  <c:v>2.08</c:v>
+                  <c:v>2.8</c:v>
                 </c:pt>
                 <c:pt idx="1">
-                  <c:v>2.8876144495709739</c:v>
+                  <c:v>3.5522212117468661</c:v>
                 </c:pt>
                 <c:pt idx="2">
-                  <c:v>3.4985029815267707</c:v>
+                  <c:v>4.0827349036508807</c:v>
                 </c:pt>
                 <c:pt idx="3">
-                  <c:v>4.0088063506591718</c:v>
+                  <c:v>4.5065269775658479</c:v>
                 </c:pt>
                 <c:pt idx="4">
-                  <c:v>4.4553524301928533</c:v>
+                  <c:v>4.865311593364674</c:v>
                 </c:pt>
                 <c:pt idx="5">
-                  <c:v>4.8568883467903046</c:v>
+                  <c:v>5.1795634023885562</c:v>
                 </c:pt>
                 <c:pt idx="6">
-                  <c:v>5.2244872514742031</c:v>
+                  <c:v>5.46104336197038</c:v>
                 </c:pt>
                 <c:pt idx="7">
-                  <c:v>5.5653303575458208</c:v>
+                  <c:v>5.7172074003638924</c:v>
                 </c:pt>
                 <c:pt idx="8">
-                  <c:v>5.8843861114190874</c:v>
+                  <c:v>5.9531158191032736</c:v>
                 </c:pt>
                 <c:pt idx="9">
-                  <c:v>6.185259641998095</c:v>
+                  <c:v>6.1723796584671229</c:v>
                 </c:pt>
                 <c:pt idx="10">
-                  <c:v>6.4706643037049192</c:v>
+                  <c:v>6.3776769440526957</c:v>
                 </c:pt>
                 <c:pt idx="11">
-                  <c:v>6.7427023894925791</c:v>
+                  <c:v>6.5710553519829995</c:v>
                 </c:pt>
                 <c:pt idx="12">
-                  <c:v>7.0030416343583894</c:v>
+                  <c:v>6.7541199447283047</c:v>
                 </c:pt>
                 <c:pt idx="13">
-                  <c:v>7.2530311918058894</c:v>
+                  <c:v>6.9281550245216437</c:v>
                 </c:pt>
                 <c:pt idx="14">
-                  <c:v>7.4937806542222294</c:v>
+                  <c:v>7.0942062354882998</c:v>
                 </c:pt>
                 <c:pt idx="15">
-                  <c:v>7.7262155562910122</c:v>
+                  <c:v>7.2531376426888494</c:v>
                 </c:pt>
                 <c:pt idx="16">
-                  <c:v>7.9511173829395085</c:v>
+                  <c:v>7.4056724869061972</c:v>
                 </c:pt>
                 <c:pt idx="17">
-                  <c:v>8.1691530587444738</c:v>
+                  <c:v>7.5524229602158828</c:v>
                 </c:pt>
                 <c:pt idx="18">
-                  <c:v>8.3808971109954644</c:v>
+                  <c:v>7.6939123999108485</c:v>
                 </c:pt>
                 <c:pt idx="19">
-                  <c:v>8.5868486137412887</c:v>
+                  <c:v>7.8305921249149231</c:v>
                 </c:pt>
                 <c:pt idx="20">
-                  <c:v>8.7874443395341828</c:v>
+                  <c:v>7.9628544086669377</c:v>
                 </c:pt>
                 <c:pt idx="21">
-                  <c:v>8.983069106587223</c:v>
+                  <c:v>8.0910426151188997</c:v>
                 </c:pt>
                 <c:pt idx="22">
-                  <c:v>9.1740640188608555</c:v>
+                  <c:v>8.2154592177933434</c:v>
                 </c:pt>
                 <c:pt idx="23">
-                  <c:v>9.360733100507451</c:v>
+                  <c:v>8.3363722160274225</c:v>
                 </c:pt>
                 <c:pt idx="24">
-                  <c:v>9.5433486909737315</c:v>
+                  <c:v>8.4540203216173957</c:v>
                 </c:pt>
                 <c:pt idx="25">
-                  <c:v>9.7221558722694272</c:v>
+                  <c:v>8.5686171908380224</c:v>
                 </c:pt>
                 <c:pt idx="26">
-                  <c:v>9.8973761323338429</c:v>
+                  <c:v>8.6803549071889776</c:v>
                 </c:pt>
                 <c:pt idx="27">
-                  <c:v>10.069210419542145</c:v>
+                  <c:v>8.7894068701344334</c:v>
                 </c:pt>
                 <c:pt idx="28">
-                  <c:v>10.237841707543112</c:v>
+                  <c:v>8.895930208572203</c:v>
                 </c:pt>
                 <c:pt idx="29">
-                  <c:v>10.403437163003625</c:v>
+                  <c:v>9.0000678107887229</c:v>
                 </c:pt>
                 <c:pt idx="30">
-                  <c:v>10.566149988847576</c:v>
+                  <c:v>9.1019500424953552</c:v>
                 </c:pt>
                 <c:pt idx="31">
-                  <c:v>10.726121000406712</c:v>
+                  <c:v>9.2016962093139263</c:v>
                 </c:pt>
                 <c:pt idx="32">
-                  <c:v>10.883479980274279</c:v>
+                  <c:v>9.2994158084619372</c:v>
                 </c:pt>
                 <c:pt idx="33">
-                  <c:v>11.038346848659168</c:v>
+                  <c:v>9.3952096054422736</c:v>
                 </c:pt>
                 <c:pt idx="34">
-                  <c:v>11.190832679022678</c:v>
+                  <c:v>9.4891705645934614</c:v>
                 </c:pt>
                 <c:pt idx="35">
-                  <c:v>11.341040583263204</c:v>
+                  <c:v>9.5813846569153274</c:v>
                 </c:pt>
                 <c:pt idx="36">
-                  <c:v>11.489066486343532</c:v>
+                  <c:v>9.6719315642912758</c:v>
                 </c:pt>
                 <c:pt idx="37">
-                  <c:v>11.634999806768336</c:v>
+                  <c:v>9.7608852958162693</c:v>
                 </c:pt>
                 <c:pt idx="38">
-                  <c:v>11.778924056518717</c:v>
+                  <c:v>9.848314729209573</c:v>
                 </c:pt>
                 <c:pt idx="39">
-                  <c:v>11.92091737178742</c:v>
+                  <c:v>9.9342840880931291</c:v>
                 </c:pt>
                 <c:pt idx="40">
-                  <c:v>12.061052984018335</c:v>
+                  <c:v>10.018853364135861</c:v>
                 </c:pt>
                 <c:pt idx="41">
-                  <c:v>12.199399639249794</c:v>
+                  <c:v>10.102078691613837</c:v>
                 </c:pt>
                 <c:pt idx="42">
-                  <c:v>12.336021972525179</c:v>
+                  <c:v>10.184012680748173</c:v>
                 </c:pt>
                 <c:pt idx="43">
-                  <c:v>12.470980843113404</c:v>
+                  <c:v>10.264704715204712</c:v>
                 </c:pt>
                 <c:pt idx="44">
-                  <c:v>12.604333635434662</c:v>
+                  <c:v>10.344201218330644</c:v>
                 </c:pt>
                 <c:pt idx="45">
-                  <c:v>12.736134529880655</c:v>
+                  <c:v>10.422545892031014</c:v>
                 </c:pt>
                 <c:pt idx="46">
-                  <c:v>12.866434747127142</c:v>
+                  <c:v>10.499779931627018</c:v>
                 </c:pt>
                 <c:pt idx="47">
-                  <c:v>12.995282769039722</c:v>
+                  <c:v>10.575942219567802</c:v>
                 </c:pt>
                 <c:pt idx="48">
-                  <c:v>13.122724538854074</c:v>
+                  <c:v>10.651069500471698</c:v>
                 </c:pt>
                 <c:pt idx="49">
-                  <c:v>13.248803642956723</c:v>
+                  <c:v>10.725196539638706</c:v>
                 </c:pt>
                 <c:pt idx="50">
-                  <c:v>13.373561476289998</c:v>
+                  <c:v>10.798356266892483</c:v>
                 </c:pt>
                 <c:pt idx="51">
-                  <c:v>13.497037393147355</c:v>
+                  <c:v>10.870579907369168</c:v>
                 </c:pt>
                 <c:pt idx="52">
-                  <c:v>13.619268844904353</c:v>
+                  <c:v>10.94189710066445</c:v>
                 </c:pt>
                 <c:pt idx="53">
-                  <c:v>13.740291506041386</c:v>
+                  <c:v>11.012336009574176</c:v>
                 </c:pt>
                 <c:pt idx="54">
-                  <c:v>13.860139389650893</c:v>
+                  <c:v>11.081923419512202</c:v>
                 </c:pt>
                 <c:pt idx="55">
-                  <c:v>13.978844953481019</c:v>
+                  <c:v>11.150684829558992</c:v>
                 </c:pt>
                 <c:pt idx="56">
-                  <c:v>14.096439197445546</c:v>
+                  <c:v>11.218644535981548</c:v>
                 </c:pt>
                 <c:pt idx="57">
-                  <c:v>14.212951753423965</c:v>
+                  <c:v>11.285825708967824</c:v>
                 </c:pt>
                 <c:pt idx="58">
-                  <c:v>14.328410968083151</c:v>
+                  <c:v>11.35225046323372</c:v>
                 </c:pt>
                 <c:pt idx="59">
-                  <c:v>14.442843979371592</c:v>
+                  <c:v>11.417939923087099</c:v>
                 </c:pt>
                 <c:pt idx="60">
-                  <c:v>14.556276787266684</c:v>
+                  <c:v>11.482914282468647</c:v>
                 </c:pt>
                 <c:pt idx="61">
-                  <c:v>14.668734319293485</c:v>
+                  <c:v>11.547192860432963</c:v>
                 </c:pt>
                 <c:pt idx="62">
-                  <c:v>14.780240491279267</c:v>
+                  <c:v>11.610794152483853</c:v>
                 </c:pt>
                 <c:pt idx="63">
-                  <c:v>14.89081826376014</c:v>
+                  <c:v>11.673735878134163</c:v>
                 </c:pt>
                 <c:pt idx="64">
-                  <c:v>15.000489694413639</c:v>
+                  <c:v>11.736035025022213</c:v>
                 </c:pt>
                 <c:pt idx="65">
-                  <c:v>15.109275986854044</c:v>
+                  <c:v>11.797707889883082</c:v>
                 </c:pt>
                 <c:pt idx="66">
-                  <c:v>15.217197536093702</c:v>
+                  <c:v>11.858770116642992</c:v>
                 </c:pt>
                 <c:pt idx="67">
-                  <c:v>15.324273970944441</c:v>
+                  <c:v>11.919236731878554</c:v>
                 </c:pt>
                 <c:pt idx="68">
-                  <c:v>15.430524193606809</c:v>
+                  <c:v>11.97912217785902</c:v>
                 </c:pt>
                 <c:pt idx="69">
-                  <c:v>15.535966416671609</c:v>
+                  <c:v>12.038440343368887</c:v>
                 </c:pt>
                 <c:pt idx="70">
-                  <c:v>15.64061819773721</c:v>
+                  <c:v>12.097204592489296</c:v>
                 </c:pt>
                 <c:pt idx="71">
-                  <c:v>15.744496471827718</c:v>
+                  <c:v>12.155427791500214</c:v>
                 </c:pt>
                 <c:pt idx="72">
-                  <c:v>15.84761758178008</c:v>
+                  <c:v>12.213122334050334</c:v>
                 </c:pt>
                 <c:pt idx="73">
-                  <c:v>15.949997306753463</c:v>
+                  <c:v>12.270300164728402</c:v>
                 </c:pt>
                 <c:pt idx="74">
-                  <c:v>16.051650889000577</c:v>
+                  <c:v>12.326972801157565</c:v>
                 </c:pt>
                 <c:pt idx="75">
-                  <c:v>16.152593059028717</c:v>
+                  <c:v>12.383151354723799</c:v>
                 </c:pt>
                 <c:pt idx="76">
-                  <c:v>16.252838059267091</c:v>
+                  <c:v>12.438846550039468</c:v>
                 </c:pt>
                 <c:pt idx="77">
-                  <c:v>16.352399666347399</c:v>
+                  <c:v>12.494068743234765</c:v>
                 </c:pt>
                 <c:pt idx="78">
-                  <c:v>16.451291212095569</c:v>
+                  <c:v>12.548827939161528</c:v>
                 </c:pt>
                 <c:pt idx="79">
-                  <c:v>16.549525603324515</c:v>
+                  <c:v>12.603133807587065</c:v>
                 </c:pt>
                 <c:pt idx="80">
-                  <c:v>16.647115340510503</c:v>
+                  <c:v>12.656995698449162</c:v>
                 </c:pt>
                 <c:pt idx="81">
-                  <c:v>16.744072535429062</c:v>
+                  <c:v>12.710422656237448</c:v>
                 </c:pt>
                 <c:pt idx="82">
-                  <c:v>16.840408927820356</c:v>
+                  <c:v>12.763423433561329</c:v>
                 </c:pt>
                 <c:pt idx="83">
-                  <c:v>16.936135901148376</c:v>
+                  <c:v>12.816006503959533</c:v>
                 </c:pt>
                 <c:pt idx="84">
-                  <c:v>17.031264497513551</c:v>
+                  <c:v>12.868180074002332</c:v>
                 </c:pt>
                 <c:pt idx="85">
-                  <c:v>17.125805431773422</c:v>
+                  <c:v>12.919952094733114</c:v>
                 </c:pt>
                 <c:pt idx="86">
-                  <c:v>17.219769104922449</c:v>
+                  <c:v>12.971330272492855</c:v>
                 </c:pt>
                 <c:pt idx="87">
-                  <c:v>17.313165616777439</c:v>
+                  <c:v>13.022322079167235</c:v>
                 </c:pt>
               </c:numCache>
             </c:numRef>
@@ -718,7 +718,7 @@
           <c:smooth val="0"/>
           <c:extLst>
             <c:ext xmlns:c16="http://schemas.microsoft.com/office/drawing/2014/chart" uri="{C3380CC4-5D6E-409C-BE32-E72D297353CC}">
-              <c16:uniqueId val="{00000000-7A9F-4D11-B605-56FD4B9400AA}"/>
+              <c16:uniqueId val="{00000000-8CF9-456F-90E8-10E7399EA6AB}"/>
             </c:ext>
           </c:extLst>
         </c:ser>
@@ -727,11 +727,11 @@
           <c:order val="1"/>
           <c:tx>
             <c:strRef>
-              <c:f>Sheet2!$C$1</c:f>
+              <c:f>wpm!$C$1</c:f>
               <c:strCache>
                 <c:ptCount val="1"/>
                 <c:pt idx="0">
-                  <c:v>wpm avg</c:v>
+                  <c:v>WPM average</c:v>
                 </c:pt>
               </c:strCache>
             </c:strRef>
@@ -748,7 +748,7 @@
             <c:size val="5"/>
             <c:spPr>
               <a:noFill/>
-              <a:ln w="12700">
+              <a:ln w="3175">
                 <a:solidFill>
                   <a:schemeClr val="tx1"/>
                 </a:solidFill>
@@ -758,7 +758,7 @@
           </c:marker>
           <c:xVal>
             <c:numRef>
-              <c:f>Sheet2!$A$2:$A$89</c:f>
+              <c:f>wpm!$A$2:$A$89</c:f>
               <c:numCache>
                 <c:formatCode>General</c:formatCode>
                 <c:ptCount val="88"/>
@@ -1031,273 +1031,273 @@
           </c:xVal>
           <c:yVal>
             <c:numRef>
-              <c:f>Sheet2!$C$2:$C$89</c:f>
+              <c:f>wpm!$C$2:$C$89</c:f>
               <c:numCache>
                 <c:formatCode>General</c:formatCode>
                 <c:ptCount val="88"/>
                 <c:pt idx="0">
-                  <c:v>2.2464000000000004</c:v>
+                  <c:v>3.024</c:v>
                 </c:pt>
                 <c:pt idx="1">
-                  <c:v>3.1763758945280713</c:v>
+                  <c:v>3.9074433329215532</c:v>
                 </c:pt>
                 <c:pt idx="2">
-                  <c:v>3.6734281306031096</c:v>
+                  <c:v>4.2868716488334249</c:v>
                 </c:pt>
                 <c:pt idx="3">
-                  <c:v>4.513425965473731</c:v>
+                  <c:v>5.0737985563480876</c:v>
                 </c:pt>
                 <c:pt idx="4">
-                  <c:v>4.8563341489102108</c:v>
+                  <c:v>5.8383739120376088</c:v>
                 </c:pt>
                 <c:pt idx="5">
-                  <c:v>5.2454394145335295</c:v>
+                  <c:v>5.5939284745796414</c:v>
                 </c:pt>
                 <c:pt idx="6">
-                  <c:v>5.694691104106882</c:v>
+                  <c:v>5.9525372645477148</c:v>
                 </c:pt>
                 <c:pt idx="7">
-                  <c:v>5.8992501789985701</c:v>
+                  <c:v>5.4313470303456972</c:v>
                 </c:pt>
                 <c:pt idx="8">
-                  <c:v>6.3551370003326149</c:v>
+                  <c:v>6.4293650846315362</c:v>
                 </c:pt>
                 <c:pt idx="9">
-                  <c:v>6.7419330097779238</c:v>
+                  <c:v>6.7278938277291642</c:v>
                 </c:pt>
                 <c:pt idx="10">
-                  <c:v>6.8589041619272146</c:v>
+                  <c:v>6.7603375606958576</c:v>
                 </c:pt>
                 <c:pt idx="11">
-                  <c:v>7.0798375089672083</c:v>
+                  <c:v>6.8996081195821501</c:v>
                 </c:pt>
                 <c:pt idx="12">
-                  <c:v>7.7033457977942295</c:v>
+                  <c:v>7.4295319392011354</c:v>
                 </c:pt>
                 <c:pt idx="13">
-                  <c:v>7.8332736871503608</c:v>
+                  <c:v>7.482407426483376</c:v>
                 </c:pt>
                 <c:pt idx="14">
-                  <c:v>7.8684696869333415</c:v>
+                  <c:v>7.1013004417237875</c:v>
                 </c:pt>
                 <c:pt idx="15">
-                  <c:v>8.1897884896684729</c:v>
+                  <c:v>7.688325901250181</c:v>
                 </c:pt>
                 <c:pt idx="16">
-                  <c:v>8.7462291212334602</c:v>
+                  <c:v>8.1462397355968168</c:v>
                 </c:pt>
                 <c:pt idx="17">
-                  <c:v>8.9043768340314777</c:v>
+                  <c:v>8.232141026635313</c:v>
                 </c:pt>
                 <c:pt idx="18">
-                  <c:v>8.9675599087651481</c:v>
+                  <c:v>8.2324862679046085</c:v>
                 </c:pt>
                 <c:pt idx="19">
-                  <c:v>9.1879280167031787</c:v>
+                  <c:v>8.3787335736589679</c:v>
                 </c:pt>
                 <c:pt idx="20">
-                  <c:v>9.4904398866969188</c:v>
+                  <c:v>8.5998827613602931</c:v>
                 </c:pt>
                 <c:pt idx="21">
-                  <c:v>9.3423918708507117</c:v>
+                  <c:v>8.4146843197236567</c:v>
                 </c:pt>
                 <c:pt idx="22">
-                  <c:v>9.5410265796152895</c:v>
+                  <c:v>8.5440775865050771</c:v>
                 </c:pt>
                 <c:pt idx="23">
-                  <c:v>9.5479477625175999</c:v>
+                  <c:v>8.5030996603479707</c:v>
                 </c:pt>
                 <c:pt idx="24">
-                  <c:v>9.9250826386126807</c:v>
+                  <c:v>8.7921811344820924</c:v>
                 </c:pt>
                 <c:pt idx="25">
-                  <c:v>10.01382054843751</c:v>
+                  <c:v>8.3115586751128809</c:v>
                 </c:pt>
                 <c:pt idx="26">
-                  <c:v>10.392244938950535</c:v>
+                  <c:v>9.1143726525484272</c:v>
                 </c:pt>
                 <c:pt idx="27">
-                  <c:v>10.572670940519252</c:v>
+                  <c:v>9.2288772136411552</c:v>
                 </c:pt>
                 <c:pt idx="28">
-                  <c:v>10.544976958769405</c:v>
+                  <c:v>9.1628081148293692</c:v>
                 </c:pt>
                 <c:pt idx="29">
-                  <c:v>10.819574649523771</c:v>
+                  <c:v>9.3600705232202728</c:v>
                 </c:pt>
                 <c:pt idx="30">
-                  <c:v>10.566149988847576</c:v>
+                  <c:v>9.1019500424953552</c:v>
                 </c:pt>
                 <c:pt idx="31">
-                  <c:v>11.262427050427048</c:v>
+                  <c:v>9.6617810197796228</c:v>
                 </c:pt>
                 <c:pt idx="32">
-                  <c:v>11.209984379682508</c:v>
+                  <c:v>9.5783982827157956</c:v>
                 </c:pt>
                 <c:pt idx="33">
-                  <c:v>11.369497254118944</c:v>
+                  <c:v>9.6770658936055423</c:v>
                 </c:pt>
                 <c:pt idx="34">
-                  <c:v>11.414649332603132</c:v>
+                  <c:v>9.6789539758853316</c:v>
                 </c:pt>
                 <c:pt idx="35">
-                  <c:v>11.681271800761101</c:v>
+                  <c:v>9.8688261966227877</c:v>
                 </c:pt>
                 <c:pt idx="36">
-                  <c:v>11.489066486343532</c:v>
+                  <c:v>9.6719315642912758</c:v>
                 </c:pt>
                 <c:pt idx="37">
-                  <c:v>11.984049800971386</c:v>
+                  <c:v>10.053711854690757</c:v>
                 </c:pt>
                 <c:pt idx="38">
-                  <c:v>12.367870259344652</c:v>
+                  <c:v>10.340730465670052</c:v>
                 </c:pt>
                 <c:pt idx="39">
-                  <c:v>12.397754066658917</c:v>
+                  <c:v>10.331655451616856</c:v>
                 </c:pt>
                 <c:pt idx="40">
-                  <c:v>11.699221394497785</c:v>
+                  <c:v>9.7182877632117854</c:v>
                 </c:pt>
                 <c:pt idx="41">
-                  <c:v>11.955411646464798</c:v>
+                  <c:v>9.9000371177815598</c:v>
                 </c:pt>
                 <c:pt idx="42">
-                  <c:v>11.719220873898919</c:v>
+                  <c:v>9.3692916662883192</c:v>
                 </c:pt>
                 <c:pt idx="43">
-                  <c:v>11.847431800957732</c:v>
+                  <c:v>9.7514694794444754</c:v>
                 </c:pt>
                 <c:pt idx="44">
-                  <c:v>11.974116953662929</c:v>
+                  <c:v>9.8269911574141116</c:v>
                 </c:pt>
                 <c:pt idx="45">
-                  <c:v>12.099327803386622</c:v>
+                  <c:v>10.318320433110703</c:v>
                 </c:pt>
                 <c:pt idx="46">
-                  <c:v>12.73777039965587</c:v>
+                  <c:v>10.394782132310747</c:v>
                 </c:pt>
                 <c:pt idx="47">
-                  <c:v>12.865329941349325</c:v>
+                  <c:v>10.470182797372123</c:v>
                 </c:pt>
                 <c:pt idx="48">
-                  <c:v>12.59781555729991</c:v>
+                  <c:v>10.22502672045283</c:v>
                 </c:pt>
                 <c:pt idx="49">
-                  <c:v>12.983827570097588</c:v>
+                  <c:v>10.510692608845931</c:v>
                 </c:pt>
                 <c:pt idx="50">
-                  <c:v>12.838619017238397</c:v>
+                  <c:v>10.366422016216784</c:v>
                 </c:pt>
                 <c:pt idx="51">
-                  <c:v>13.497037393147355</c:v>
+                  <c:v>10.870579907369168</c:v>
                 </c:pt>
                 <c:pt idx="52">
-                  <c:v>12.938305402659134</c:v>
+                  <c:v>10.394802245631228</c:v>
                 </c:pt>
                 <c:pt idx="53">
-                  <c:v>13.328082760860143</c:v>
+                  <c:v>10.68196592928695</c:v>
                 </c:pt>
                 <c:pt idx="54">
-                  <c:v>13.444335207961366</c:v>
+                  <c:v>10.749465716926837</c:v>
                 </c:pt>
                 <c:pt idx="55">
-                  <c:v>13.279902705806968</c:v>
+                  <c:v>10.593150588081041</c:v>
                 </c:pt>
                 <c:pt idx="56">
-                  <c:v>13.814510413496635</c:v>
+                  <c:v>10.994271645261918</c:v>
                 </c:pt>
                 <c:pt idx="57">
-                  <c:v>13.502304165752767</c:v>
+                  <c:v>10.721534423519433</c:v>
                 </c:pt>
                 <c:pt idx="58">
-                  <c:v>13.611990419678992</c:v>
+                  <c:v>10.784637940072033</c:v>
                 </c:pt>
                 <c:pt idx="59">
-                  <c:v>13.865130220196727</c:v>
+                  <c:v>10.961222326163615</c:v>
                 </c:pt>
                 <c:pt idx="60">
-                  <c:v>14.410714019394018</c:v>
+                  <c:v>11.368085139643961</c:v>
                 </c:pt>
                 <c:pt idx="61">
-                  <c:v>15.40217103525816</c:v>
+                  <c:v>12.124552503454611</c:v>
                 </c:pt>
                 <c:pt idx="62">
-                  <c:v>15.519252515843231</c:v>
+                  <c:v>12.191333860108047</c:v>
                 </c:pt>
                 <c:pt idx="63">
-                  <c:v>15.486450994310546</c:v>
+                  <c:v>12.14068531325953</c:v>
                 </c:pt>
                 <c:pt idx="64">
-                  <c:v>15.600509282190185</c:v>
+                  <c:v>11.618674674771992</c:v>
                 </c:pt>
                 <c:pt idx="65">
-                  <c:v>15.713647026328207</c:v>
+                  <c:v>12.269616205478405</c:v>
                 </c:pt>
                 <c:pt idx="66">
-                  <c:v>15.825885437537449</c:v>
+                  <c:v>12.333120921308712</c:v>
                 </c:pt>
                 <c:pt idx="67">
-                  <c:v>15.784002190072774</c:v>
+                  <c:v>12.276813833834911</c:v>
                 </c:pt>
                 <c:pt idx="68">
-                  <c:v>16.202050403287149</c:v>
+                  <c:v>12.817660730309152</c:v>
                 </c:pt>
                 <c:pt idx="69">
-                  <c:v>16.157405073338474</c:v>
+                  <c:v>12.519977957103643</c:v>
                 </c:pt>
                 <c:pt idx="70">
-                  <c:v>16.422649107624071</c:v>
+                  <c:v>12.702064822113762</c:v>
                 </c:pt>
                 <c:pt idx="71">
-                  <c:v>16.374276330700827</c:v>
+                  <c:v>12.641644903160223</c:v>
                 </c:pt>
                 <c:pt idx="72">
-                  <c:v>16.639998460869084</c:v>
+                  <c:v>12.823778450752851</c:v>
                 </c:pt>
                 <c:pt idx="73">
-                  <c:v>16.587997199023601</c:v>
+                  <c:v>12.761112171317539</c:v>
                 </c:pt>
                 <c:pt idx="74">
-                  <c:v>16.533200415670596</c:v>
+                  <c:v>12.696781985192292</c:v>
                 </c:pt>
                 <c:pt idx="75">
-                  <c:v>16.798696781389868</c:v>
+                  <c:v>12.395534506078521</c:v>
                 </c:pt>
                 <c:pt idx="76">
-                  <c:v>16.740423201045104</c:v>
+                  <c:v>12.812011946540652</c:v>
                 </c:pt>
                 <c:pt idx="77">
-                  <c:v>17.333543646328245</c:v>
+                  <c:v>13.243712867828851</c:v>
                 </c:pt>
                 <c:pt idx="78">
-                  <c:v>17.438368684821302</c:v>
+                  <c:v>12.799804497944759</c:v>
                 </c:pt>
                 <c:pt idx="79">
-                  <c:v>17.542497139523988</c:v>
+                  <c:v>13.359321836042289</c:v>
                 </c:pt>
                 <c:pt idx="80">
-                  <c:v>17.645942260941133</c:v>
+                  <c:v>13.28984548337162</c:v>
                 </c:pt>
                 <c:pt idx="81">
-                  <c:v>17.748716887554806</c:v>
+                  <c:v>13.473048015611695</c:v>
                 </c:pt>
                 <c:pt idx="82">
-                  <c:v>18.01923755276778</c:v>
+                  <c:v>13.273960370903783</c:v>
                 </c:pt>
                 <c:pt idx="83">
-                  <c:v>17.782942696205794</c:v>
+                  <c:v>12.687846438919937</c:v>
                 </c:pt>
                 <c:pt idx="84">
-                  <c:v>18.223453012339501</c:v>
+                  <c:v>13.254225476222402</c:v>
                 </c:pt>
                 <c:pt idx="85">
-                  <c:v>18.153353757679827</c:v>
+                  <c:v>13.178351136627777</c:v>
                 </c:pt>
                 <c:pt idx="86">
-                  <c:v>18.252955251217795</c:v>
+                  <c:v>13.101043575217783</c:v>
                 </c:pt>
                 <c:pt idx="87">
-                  <c:v>17.313165616777439</c:v>
+                  <c:v>13.022322079167235</c:v>
                 </c:pt>
               </c:numCache>
             </c:numRef>
@@ -1305,7 +1305,7 @@
           <c:smooth val="0"/>
           <c:extLst>
             <c:ext xmlns:c16="http://schemas.microsoft.com/office/drawing/2014/chart" uri="{C3380CC4-5D6E-409C-BE32-E72D297353CC}">
-              <c16:uniqueId val="{00000001-7A9F-4D11-B605-56FD4B9400AA}"/>
+              <c16:uniqueId val="{00000001-8CF9-456F-90E8-10E7399EA6AB}"/>
             </c:ext>
           </c:extLst>
         </c:ser>
@@ -1350,7 +1350,7 @@
             <a:pPr>
               <a:defRPr sz="1500" b="0" i="0" u="none" strike="noStrike" kern="1200" baseline="0">
                 <a:solidFill>
-                  <a:schemeClr val="tx1"/>
+                  <a:sysClr val="windowText" lastClr="000000"/>
                 </a:solidFill>
                 <a:latin typeface="+mn-lt"/>
                 <a:ea typeface="+mn-ea"/>
@@ -1431,10 +1431,10 @@
         <c:manualLayout>
           <c:xMode val="edge"/>
           <c:yMode val="edge"/>
-          <c:x val="0.67738035870516189"/>
-          <c:y val="0.79976509186351696"/>
-          <c:w val="0.26468372703412074"/>
-          <c:h val="4.4679352580927381E-2"/>
+          <c:x val="0.64631485126859145"/>
+          <c:y val="0.79976506266623837"/>
+          <c:w val="0.32959251968503939"/>
+          <c:h val="4.467935909585289E-2"/>
         </c:manualLayout>
       </c:layout>
       <c:overlay val="0"/>
@@ -1452,7 +1452,7 @@
           <a:pPr>
             <a:defRPr sz="1500" b="0" i="0" u="none" strike="noStrike" kern="1200" baseline="0">
               <a:solidFill>
-                <a:schemeClr val="tx1"/>
+                <a:sysClr val="windowText" lastClr="000000"/>
               </a:solidFill>
               <a:latin typeface="+mn-lt"/>
               <a:ea typeface="+mn-ea"/>
@@ -1479,7 +1479,12 @@
       <a:schemeClr val="bg1"/>
     </a:solidFill>
     <a:ln w="9525" cap="flat" cmpd="sng" algn="ctr">
-      <a:noFill/>
+      <a:solidFill>
+        <a:schemeClr val="tx1">
+          <a:lumMod val="15000"/>
+          <a:lumOff val="85000"/>
+        </a:schemeClr>
+      </a:solidFill>
       <a:prstDash val="sysDot"/>
       <a:round/>
     </a:ln>
@@ -1902,10 +1907,7 @@
           <a:pPr>
             <a:defRPr sz="1500" b="0" i="0" u="none" strike="noStrike" kern="1200" baseline="0">
               <a:solidFill>
-                <a:schemeClr val="tx1">
-                  <a:lumMod val="65000"/>
-                  <a:lumOff val="35000"/>
-                </a:schemeClr>
+                <a:schemeClr val="tx1"/>
               </a:solidFill>
               <a:latin typeface="+mn-lt"/>
               <a:ea typeface="+mn-ea"/>
@@ -3202,7 +3204,7 @@
           <a:p>
             <a:fld id="{A1ACBD55-BE38-45B6-9B46-30AD92DEC746}" type="datetimeFigureOut">
               <a:rPr lang="en-GB" smtClean="0"/>
-              <a:t>22/02/2021</a:t>
+              <a:t>24/02/2021</a:t>
             </a:fld>
             <a:endParaRPr lang="en-GB"/>
           </a:p>
@@ -3372,7 +3374,7 @@
           <a:p>
             <a:fld id="{A1ACBD55-BE38-45B6-9B46-30AD92DEC746}" type="datetimeFigureOut">
               <a:rPr lang="en-GB" smtClean="0"/>
-              <a:t>22/02/2021</a:t>
+              <a:t>24/02/2021</a:t>
             </a:fld>
             <a:endParaRPr lang="en-GB"/>
           </a:p>
@@ -3552,7 +3554,7 @@
           <a:p>
             <a:fld id="{A1ACBD55-BE38-45B6-9B46-30AD92DEC746}" type="datetimeFigureOut">
               <a:rPr lang="en-GB" smtClean="0"/>
-              <a:t>22/02/2021</a:t>
+              <a:t>24/02/2021</a:t>
             </a:fld>
             <a:endParaRPr lang="en-GB"/>
           </a:p>
@@ -3722,7 +3724,7 @@
           <a:p>
             <a:fld id="{A1ACBD55-BE38-45B6-9B46-30AD92DEC746}" type="datetimeFigureOut">
               <a:rPr lang="en-GB" smtClean="0"/>
-              <a:t>22/02/2021</a:t>
+              <a:t>24/02/2021</a:t>
             </a:fld>
             <a:endParaRPr lang="en-GB"/>
           </a:p>
@@ -3966,7 +3968,7 @@
           <a:p>
             <a:fld id="{A1ACBD55-BE38-45B6-9B46-30AD92DEC746}" type="datetimeFigureOut">
               <a:rPr lang="en-GB" smtClean="0"/>
-              <a:t>22/02/2021</a:t>
+              <a:t>24/02/2021</a:t>
             </a:fld>
             <a:endParaRPr lang="en-GB"/>
           </a:p>
@@ -4198,7 +4200,7 @@
           <a:p>
             <a:fld id="{A1ACBD55-BE38-45B6-9B46-30AD92DEC746}" type="datetimeFigureOut">
               <a:rPr lang="en-GB" smtClean="0"/>
-              <a:t>22/02/2021</a:t>
+              <a:t>24/02/2021</a:t>
             </a:fld>
             <a:endParaRPr lang="en-GB"/>
           </a:p>
@@ -4565,7 +4567,7 @@
           <a:p>
             <a:fld id="{A1ACBD55-BE38-45B6-9B46-30AD92DEC746}" type="datetimeFigureOut">
               <a:rPr lang="en-GB" smtClean="0"/>
-              <a:t>22/02/2021</a:t>
+              <a:t>24/02/2021</a:t>
             </a:fld>
             <a:endParaRPr lang="en-GB"/>
           </a:p>
@@ -4683,7 +4685,7 @@
           <a:p>
             <a:fld id="{A1ACBD55-BE38-45B6-9B46-30AD92DEC746}" type="datetimeFigureOut">
               <a:rPr lang="en-GB" smtClean="0"/>
-              <a:t>22/02/2021</a:t>
+              <a:t>24/02/2021</a:t>
             </a:fld>
             <a:endParaRPr lang="en-GB"/>
           </a:p>
@@ -4778,7 +4780,7 @@
           <a:p>
             <a:fld id="{A1ACBD55-BE38-45B6-9B46-30AD92DEC746}" type="datetimeFigureOut">
               <a:rPr lang="en-GB" smtClean="0"/>
-              <a:t>22/02/2021</a:t>
+              <a:t>24/02/2021</a:t>
             </a:fld>
             <a:endParaRPr lang="en-GB"/>
           </a:p>
@@ -5055,7 +5057,7 @@
           <a:p>
             <a:fld id="{A1ACBD55-BE38-45B6-9B46-30AD92DEC746}" type="datetimeFigureOut">
               <a:rPr lang="en-GB" smtClean="0"/>
-              <a:t>22/02/2021</a:t>
+              <a:t>24/02/2021</a:t>
             </a:fld>
             <a:endParaRPr lang="en-GB"/>
           </a:p>
@@ -5312,7 +5314,7 @@
           <a:p>
             <a:fld id="{A1ACBD55-BE38-45B6-9B46-30AD92DEC746}" type="datetimeFigureOut">
               <a:rPr lang="en-GB" smtClean="0"/>
-              <a:t>22/02/2021</a:t>
+              <a:t>24/02/2021</a:t>
             </a:fld>
             <a:endParaRPr lang="en-GB"/>
           </a:p>
@@ -5525,7 +5527,7 @@
           <a:p>
             <a:fld id="{A1ACBD55-BE38-45B6-9B46-30AD92DEC746}" type="datetimeFigureOut">
               <a:rPr lang="en-GB" smtClean="0"/>
-              <a:t>22/02/2021</a:t>
+              <a:t>24/02/2021</a:t>
             </a:fld>
             <a:endParaRPr lang="en-GB"/>
           </a:p>
@@ -5932,7 +5934,7 @@
       </p:grpSpPr>
       <p:graphicFrame>
         <p:nvGraphicFramePr>
-          <p:cNvPr id="4" name="Chart 3">
+          <p:cNvPr id="9" name="Chart 8">
             <a:extLst>
               <a:ext uri="{FF2B5EF4-FFF2-40B4-BE49-F238E27FC236}">
                 <a16:creationId xmlns:a16="http://schemas.microsoft.com/office/drawing/2014/main" id="{3A3A08CB-EE74-4822-A345-687879011FFE}"/>
@@ -5945,14 +5947,14 @@
           <p:nvPr>
             <p:extLst>
               <p:ext uri="{D42A27DB-BD31-4B8C-83A1-F6EECF244321}">
-                <p14:modId xmlns:p14="http://schemas.microsoft.com/office/powerpoint/2010/main" val="43381102"/>
+                <p14:modId xmlns:p14="http://schemas.microsoft.com/office/powerpoint/2010/main" val="3388476385"/>
               </p:ext>
             </p:extLst>
           </p:nvPr>
         </p:nvGraphicFramePr>
         <p:xfrm>
           <a:off x="0" y="0"/>
-          <a:ext cx="9144000" cy="6858000"/>
+          <a:ext cx="9144000" cy="6857999"/>
         </p:xfrm>
         <a:graphic>
           <a:graphicData uri="http://schemas.openxmlformats.org/drawingml/2006/chart">
@@ -5974,10 +5976,10 @@
         </p:nvGrpSpPr>
         <p:grpSpPr>
           <a:xfrm>
-            <a:off x="6577446" y="5465618"/>
-            <a:ext cx="2416812" cy="323165"/>
+            <a:off x="6400801" y="5465618"/>
+            <a:ext cx="2505885" cy="323165"/>
             <a:chOff x="6832023" y="5465618"/>
-            <a:chExt cx="2416812" cy="323165"/>
+            <a:chExt cx="2505885" cy="323165"/>
           </a:xfrm>
         </p:grpSpPr>
         <p:sp>
@@ -6031,7 +6033,7 @@
           </p:nvSpPr>
           <p:spPr>
             <a:xfrm>
-              <a:off x="7976755" y="5465618"/>
+              <a:off x="8065828" y="5465618"/>
               <a:ext cx="1272080" cy="323165"/>
             </a:xfrm>
             <a:prstGeom prst="rect">
@@ -6174,7 +6176,7 @@
           <p:nvPr>
             <p:extLst>
               <p:ext uri="{D42A27DB-BD31-4B8C-83A1-F6EECF244321}">
-                <p14:modId xmlns:p14="http://schemas.microsoft.com/office/powerpoint/2010/main" val="1063351438"/>
+                <p14:modId xmlns:p14="http://schemas.microsoft.com/office/powerpoint/2010/main" val="2454853299"/>
               </p:ext>
             </p:extLst>
           </p:nvPr>

</xml_diff>

<commit_message>
update figures and tables, conclusion and references
added pictures, re structured some chaptertitles
</commit_message>
<xml_diff>
--- a/thesis/graphs/wpm.pptx
+++ b/thesis/graphs/wpm.pptx
@@ -1479,12 +1479,7 @@
       <a:schemeClr val="bg1"/>
     </a:solidFill>
     <a:ln w="9525" cap="flat" cmpd="sng" algn="ctr">
-      <a:solidFill>
-        <a:schemeClr val="tx1">
-          <a:lumMod val="15000"/>
-          <a:lumOff val="85000"/>
-        </a:schemeClr>
-      </a:solidFill>
+      <a:noFill/>
       <a:prstDash val="sysDot"/>
       <a:round/>
     </a:ln>
@@ -1934,12 +1929,7 @@
       <a:schemeClr val="bg1"/>
     </a:solidFill>
     <a:ln w="9525" cap="flat" cmpd="sng" algn="ctr">
-      <a:solidFill>
-        <a:schemeClr val="tx1">
-          <a:lumMod val="15000"/>
-          <a:lumOff val="85000"/>
-        </a:schemeClr>
-      </a:solidFill>
+      <a:noFill/>
       <a:prstDash val="sysDot"/>
       <a:round/>
     </a:ln>
@@ -5947,7 +5937,7 @@
           <p:nvPr>
             <p:extLst>
               <p:ext uri="{D42A27DB-BD31-4B8C-83A1-F6EECF244321}">
-                <p14:modId xmlns:p14="http://schemas.microsoft.com/office/powerpoint/2010/main" val="3388476385"/>
+                <p14:modId xmlns:p14="http://schemas.microsoft.com/office/powerpoint/2010/main" val="3035373552"/>
               </p:ext>
             </p:extLst>
           </p:nvPr>
@@ -6176,7 +6166,7 @@
           <p:nvPr>
             <p:extLst>
               <p:ext uri="{D42A27DB-BD31-4B8C-83A1-F6EECF244321}">
-                <p14:modId xmlns:p14="http://schemas.microsoft.com/office/powerpoint/2010/main" val="2454853299"/>
+                <p14:modId xmlns:p14="http://schemas.microsoft.com/office/powerpoint/2010/main" val="2241641128"/>
               </p:ext>
             </p:extLst>
           </p:nvPr>

</xml_diff>